<commit_message>
Modify SMS alert project ppt file with diagrams
</commit_message>
<xml_diff>
--- a/semi_projects/보안탐지 및 SMS 알람/연람희_보안탐지 및 SMS 알람.pptx
+++ b/semi_projects/보안탐지 및 SMS 알람/연람희_보안탐지 및 SMS 알람.pptx
@@ -17,12 +17,13 @@
     <p:sldId id="257" r:id="rId11"/>
     <p:sldId id="269" r:id="rId12"/>
     <p:sldId id="271" r:id="rId13"/>
-    <p:sldId id="270" r:id="rId14"/>
-    <p:sldId id="272" r:id="rId15"/>
-    <p:sldId id="273" r:id="rId16"/>
-    <p:sldId id="275" r:id="rId17"/>
-    <p:sldId id="274" r:id="rId18"/>
-    <p:sldId id="276" r:id="rId19"/>
+    <p:sldId id="280" r:id="rId14"/>
+    <p:sldId id="270" r:id="rId15"/>
+    <p:sldId id="272" r:id="rId16"/>
+    <p:sldId id="273" r:id="rId17"/>
+    <p:sldId id="275" r:id="rId18"/>
+    <p:sldId id="274" r:id="rId19"/>
+    <p:sldId id="276" r:id="rId20"/>
   </p:sldIdLst>
   <p:sldSz cx="12192000" cy="6858000"/>
   <p:notesSz cx="6858000" cy="9144000"/>
@@ -3715,8 +3716,537 @@
         </p:nvSpPr>
         <p:spPr>
           <a:xfrm>
-            <a:off x="6754808" y="3004212"/>
-            <a:ext cx="5166805" cy="776552"/>
+            <a:off x="6754808" y="3004211"/>
+            <a:ext cx="5166805" cy="1781141"/>
+          </a:xfrm>
+          <a:prstGeom prst="rect">
+            <a:avLst/>
+          </a:prstGeom>
+        </p:spPr>
+        <p:txBody>
+          <a:bodyPr vert="horz" lIns="91440" tIns="45720" rIns="91440" bIns="45720" rtlCol="0">
+            <a:noAutofit/>
+          </a:bodyPr>
+          <a:lstStyle>
+            <a:lvl1pPr marL="228600" indent="-228600" algn="l" defTabSz="914400" rtl="0" eaLnBrk="1" latinLnBrk="1" hangingPunct="1">
+              <a:lnSpc>
+                <a:spcPct val="90000"/>
+              </a:lnSpc>
+              <a:spcBef>
+                <a:spcPts val="1000"/>
+              </a:spcBef>
+              <a:buFont typeface="Arial" panose="020B0604020202020204" pitchFamily="34" charset="0"/>
+              <a:buChar char="•"/>
+              <a:defRPr sz="2800" kern="1200">
+                <a:solidFill>
+                  <a:schemeClr val="tx1"/>
+                </a:solidFill>
+                <a:latin typeface="+mn-lt"/>
+                <a:ea typeface="+mn-ea"/>
+                <a:cs typeface="+mn-cs"/>
+              </a:defRPr>
+            </a:lvl1pPr>
+            <a:lvl2pPr marL="685800" indent="-228600" algn="l" defTabSz="914400" rtl="0" eaLnBrk="1" latinLnBrk="1" hangingPunct="1">
+              <a:lnSpc>
+                <a:spcPct val="90000"/>
+              </a:lnSpc>
+              <a:spcBef>
+                <a:spcPts val="500"/>
+              </a:spcBef>
+              <a:buFont typeface="Arial" panose="020B0604020202020204" pitchFamily="34" charset="0"/>
+              <a:buChar char="•"/>
+              <a:defRPr sz="2400" kern="1200">
+                <a:solidFill>
+                  <a:schemeClr val="tx1"/>
+                </a:solidFill>
+                <a:latin typeface="+mn-lt"/>
+                <a:ea typeface="+mn-ea"/>
+                <a:cs typeface="+mn-cs"/>
+              </a:defRPr>
+            </a:lvl2pPr>
+            <a:lvl3pPr marL="1143000" indent="-228600" algn="l" defTabSz="914400" rtl="0" eaLnBrk="1" latinLnBrk="1" hangingPunct="1">
+              <a:lnSpc>
+                <a:spcPct val="90000"/>
+              </a:lnSpc>
+              <a:spcBef>
+                <a:spcPts val="500"/>
+              </a:spcBef>
+              <a:buFont typeface="Arial" panose="020B0604020202020204" pitchFamily="34" charset="0"/>
+              <a:buChar char="•"/>
+              <a:defRPr sz="2000" kern="1200">
+                <a:solidFill>
+                  <a:schemeClr val="tx1"/>
+                </a:solidFill>
+                <a:latin typeface="+mn-lt"/>
+                <a:ea typeface="+mn-ea"/>
+                <a:cs typeface="+mn-cs"/>
+              </a:defRPr>
+            </a:lvl3pPr>
+            <a:lvl4pPr marL="1600200" indent="-228600" algn="l" defTabSz="914400" rtl="0" eaLnBrk="1" latinLnBrk="1" hangingPunct="1">
+              <a:lnSpc>
+                <a:spcPct val="90000"/>
+              </a:lnSpc>
+              <a:spcBef>
+                <a:spcPts val="500"/>
+              </a:spcBef>
+              <a:buFont typeface="Arial" panose="020B0604020202020204" pitchFamily="34" charset="0"/>
+              <a:buChar char="•"/>
+              <a:defRPr sz="1800" kern="1200">
+                <a:solidFill>
+                  <a:schemeClr val="tx1"/>
+                </a:solidFill>
+                <a:latin typeface="+mn-lt"/>
+                <a:ea typeface="+mn-ea"/>
+                <a:cs typeface="+mn-cs"/>
+              </a:defRPr>
+            </a:lvl4pPr>
+            <a:lvl5pPr marL="2057400" indent="-228600" algn="l" defTabSz="914400" rtl="0" eaLnBrk="1" latinLnBrk="1" hangingPunct="1">
+              <a:lnSpc>
+                <a:spcPct val="90000"/>
+              </a:lnSpc>
+              <a:spcBef>
+                <a:spcPts val="500"/>
+              </a:spcBef>
+              <a:buFont typeface="Arial" panose="020B0604020202020204" pitchFamily="34" charset="0"/>
+              <a:buChar char="•"/>
+              <a:defRPr sz="1800" kern="1200">
+                <a:solidFill>
+                  <a:schemeClr val="tx1"/>
+                </a:solidFill>
+                <a:latin typeface="+mn-lt"/>
+                <a:ea typeface="+mn-ea"/>
+                <a:cs typeface="+mn-cs"/>
+              </a:defRPr>
+            </a:lvl5pPr>
+            <a:lvl6pPr marL="2514600" indent="-228600" algn="l" defTabSz="914400" rtl="0" eaLnBrk="1" latinLnBrk="1" hangingPunct="1">
+              <a:lnSpc>
+                <a:spcPct val="90000"/>
+              </a:lnSpc>
+              <a:spcBef>
+                <a:spcPts val="500"/>
+              </a:spcBef>
+              <a:buFont typeface="Arial" panose="020B0604020202020204" pitchFamily="34" charset="0"/>
+              <a:buChar char="•"/>
+              <a:defRPr sz="1800" kern="1200">
+                <a:solidFill>
+                  <a:schemeClr val="tx1"/>
+                </a:solidFill>
+                <a:latin typeface="+mn-lt"/>
+                <a:ea typeface="+mn-ea"/>
+                <a:cs typeface="+mn-cs"/>
+              </a:defRPr>
+            </a:lvl6pPr>
+            <a:lvl7pPr marL="2971800" indent="-228600" algn="l" defTabSz="914400" rtl="0" eaLnBrk="1" latinLnBrk="1" hangingPunct="1">
+              <a:lnSpc>
+                <a:spcPct val="90000"/>
+              </a:lnSpc>
+              <a:spcBef>
+                <a:spcPts val="500"/>
+              </a:spcBef>
+              <a:buFont typeface="Arial" panose="020B0604020202020204" pitchFamily="34" charset="0"/>
+              <a:buChar char="•"/>
+              <a:defRPr sz="1800" kern="1200">
+                <a:solidFill>
+                  <a:schemeClr val="tx1"/>
+                </a:solidFill>
+                <a:latin typeface="+mn-lt"/>
+                <a:ea typeface="+mn-ea"/>
+                <a:cs typeface="+mn-cs"/>
+              </a:defRPr>
+            </a:lvl7pPr>
+            <a:lvl8pPr marL="3429000" indent="-228600" algn="l" defTabSz="914400" rtl="0" eaLnBrk="1" latinLnBrk="1" hangingPunct="1">
+              <a:lnSpc>
+                <a:spcPct val="90000"/>
+              </a:lnSpc>
+              <a:spcBef>
+                <a:spcPts val="500"/>
+              </a:spcBef>
+              <a:buFont typeface="Arial" panose="020B0604020202020204" pitchFamily="34" charset="0"/>
+              <a:buChar char="•"/>
+              <a:defRPr sz="1800" kern="1200">
+                <a:solidFill>
+                  <a:schemeClr val="tx1"/>
+                </a:solidFill>
+                <a:latin typeface="+mn-lt"/>
+                <a:ea typeface="+mn-ea"/>
+                <a:cs typeface="+mn-cs"/>
+              </a:defRPr>
+            </a:lvl8pPr>
+            <a:lvl9pPr marL="3886200" indent="-228600" algn="l" defTabSz="914400" rtl="0" eaLnBrk="1" latinLnBrk="1" hangingPunct="1">
+              <a:lnSpc>
+                <a:spcPct val="90000"/>
+              </a:lnSpc>
+              <a:spcBef>
+                <a:spcPts val="500"/>
+              </a:spcBef>
+              <a:buFont typeface="Arial" panose="020B0604020202020204" pitchFamily="34" charset="0"/>
+              <a:buChar char="•"/>
+              <a:defRPr sz="1800" kern="1200">
+                <a:solidFill>
+                  <a:schemeClr val="tx1"/>
+                </a:solidFill>
+                <a:latin typeface="+mn-lt"/>
+                <a:ea typeface="+mn-ea"/>
+                <a:cs typeface="+mn-cs"/>
+              </a:defRPr>
+            </a:lvl9pPr>
+          </a:lstStyle>
+          <a:p>
+            <a:r>
+              <a:rPr lang="en-US" altLang="ko-KR" dirty="0" err="1"/>
+              <a:t>twilio</a:t>
+            </a:r>
+            <a:r>
+              <a:rPr lang="ko-KR" altLang="en-US" dirty="0"/>
+              <a:t> 모듈 설치</a:t>
+            </a:r>
+            <a:endParaRPr lang="en-US" altLang="ko-KR" dirty="0"/>
+          </a:p>
+          <a:p>
+            <a:pPr marL="0" indent="0">
+              <a:buNone/>
+            </a:pPr>
+            <a:r>
+              <a:rPr lang="en-US" altLang="ko-KR" dirty="0"/>
+              <a:t> - pip install </a:t>
+            </a:r>
+            <a:r>
+              <a:rPr lang="en-US" altLang="ko-KR" dirty="0" err="1"/>
+              <a:t>twilio</a:t>
+            </a:r>
+            <a:endParaRPr lang="en-US" altLang="ko-KR" dirty="0"/>
+          </a:p>
+        </p:txBody>
+      </p:sp>
+      <p:pic>
+        <p:nvPicPr>
+          <p:cNvPr id="7" name="그림 6">
+            <a:extLst>
+              <a:ext uri="{FF2B5EF4-FFF2-40B4-BE49-F238E27FC236}">
+                <a16:creationId xmlns:a16="http://schemas.microsoft.com/office/drawing/2014/main" id="{1C939411-0F09-49FD-8E58-19F89B49CF18}"/>
+              </a:ext>
+            </a:extLst>
+          </p:cNvPr>
+          <p:cNvPicPr>
+            <a:picLocks noChangeAspect="1"/>
+          </p:cNvPicPr>
+          <p:nvPr/>
+        </p:nvPicPr>
+        <p:blipFill>
+          <a:blip r:embed="rId2"/>
+          <a:stretch>
+            <a:fillRect/>
+          </a:stretch>
+        </p:blipFill>
+        <p:spPr>
+          <a:xfrm>
+            <a:off x="491230" y="1981170"/>
+            <a:ext cx="5257800" cy="4524375"/>
+          </a:xfrm>
+          <a:prstGeom prst="rect">
+            <a:avLst/>
+          </a:prstGeom>
+          <a:ln>
+            <a:solidFill>
+              <a:schemeClr val="tx1"/>
+            </a:solidFill>
+          </a:ln>
+        </p:spPr>
+      </p:pic>
+      <p:cxnSp>
+        <p:nvCxnSpPr>
+          <p:cNvPr id="5" name="직선 연결선 4">
+            <a:extLst>
+              <a:ext uri="{FF2B5EF4-FFF2-40B4-BE49-F238E27FC236}">
+                <a16:creationId xmlns:a16="http://schemas.microsoft.com/office/drawing/2014/main" id="{01D02BC3-4DF6-43B9-8FFF-D3A43AAA0F79}"/>
+              </a:ext>
+            </a:extLst>
+          </p:cNvPr>
+          <p:cNvCxnSpPr>
+            <a:cxnSpLocks/>
+          </p:cNvCxnSpPr>
+          <p:nvPr/>
+        </p:nvCxnSpPr>
+        <p:spPr>
+          <a:xfrm>
+            <a:off x="838200" y="1091953"/>
+            <a:ext cx="10633800" cy="0"/>
+          </a:xfrm>
+          <a:prstGeom prst="line">
+            <a:avLst/>
+          </a:prstGeom>
+          <a:ln w="25400">
+            <a:solidFill>
+              <a:schemeClr val="bg1">
+                <a:lumMod val="85000"/>
+              </a:schemeClr>
+            </a:solidFill>
+          </a:ln>
+        </p:spPr>
+        <p:style>
+          <a:lnRef idx="1">
+            <a:schemeClr val="accent1"/>
+          </a:lnRef>
+          <a:fillRef idx="0">
+            <a:schemeClr val="accent1"/>
+          </a:fillRef>
+          <a:effectRef idx="0">
+            <a:schemeClr val="accent1"/>
+          </a:effectRef>
+          <a:fontRef idx="minor">
+            <a:schemeClr val="tx1"/>
+          </a:fontRef>
+        </p:style>
+      </p:cxnSp>
+      <p:sp>
+        <p:nvSpPr>
+          <p:cNvPr id="8" name="이등변 삼각형 7">
+            <a:extLst>
+              <a:ext uri="{FF2B5EF4-FFF2-40B4-BE49-F238E27FC236}">
+                <a16:creationId xmlns:a16="http://schemas.microsoft.com/office/drawing/2014/main" id="{4E5CE14E-A08F-46F3-A739-B83E6A31AABB}"/>
+              </a:ext>
+            </a:extLst>
+          </p:cNvPr>
+          <p:cNvSpPr/>
+          <p:nvPr/>
+        </p:nvSpPr>
+        <p:spPr>
+          <a:xfrm>
+            <a:off x="11651226" y="6318000"/>
+            <a:ext cx="540774" cy="540000"/>
+          </a:xfrm>
+          <a:prstGeom prst="triangle">
+            <a:avLst>
+              <a:gd name="adj" fmla="val 100000"/>
+            </a:avLst>
+          </a:prstGeom>
+          <a:solidFill>
+            <a:srgbClr val="840202"/>
+          </a:solidFill>
+          <a:ln>
+            <a:noFill/>
+          </a:ln>
+        </p:spPr>
+        <p:style>
+          <a:lnRef idx="2">
+            <a:schemeClr val="accent1">
+              <a:shade val="50000"/>
+            </a:schemeClr>
+          </a:lnRef>
+          <a:fillRef idx="1">
+            <a:schemeClr val="accent1"/>
+          </a:fillRef>
+          <a:effectRef idx="0">
+            <a:schemeClr val="accent1"/>
+          </a:effectRef>
+          <a:fontRef idx="minor">
+            <a:schemeClr val="lt1"/>
+          </a:fontRef>
+        </p:style>
+        <p:txBody>
+          <a:bodyPr rtlCol="0" anchor="ctr"/>
+          <a:lstStyle/>
+          <a:p>
+            <a:pPr algn="ctr"/>
+            <a:endParaRPr lang="ko-KR" altLang="en-US" dirty="0"/>
+          </a:p>
+        </p:txBody>
+      </p:sp>
+      <p:sp>
+        <p:nvSpPr>
+          <p:cNvPr id="9" name="이등변 삼각형 8">
+            <a:extLst>
+              <a:ext uri="{FF2B5EF4-FFF2-40B4-BE49-F238E27FC236}">
+                <a16:creationId xmlns:a16="http://schemas.microsoft.com/office/drawing/2014/main" id="{A794E6E1-7295-4B55-82B5-68E1881635D1}"/>
+              </a:ext>
+            </a:extLst>
+          </p:cNvPr>
+          <p:cNvSpPr/>
+          <p:nvPr/>
+        </p:nvSpPr>
+        <p:spPr>
+          <a:xfrm rot="10800000">
+            <a:off x="0" y="0"/>
+            <a:ext cx="540774" cy="540000"/>
+          </a:xfrm>
+          <a:prstGeom prst="triangle">
+            <a:avLst>
+              <a:gd name="adj" fmla="val 100000"/>
+            </a:avLst>
+          </a:prstGeom>
+          <a:solidFill>
+            <a:srgbClr val="840202"/>
+          </a:solidFill>
+          <a:ln>
+            <a:noFill/>
+          </a:ln>
+        </p:spPr>
+        <p:style>
+          <a:lnRef idx="2">
+            <a:schemeClr val="accent1">
+              <a:shade val="50000"/>
+            </a:schemeClr>
+          </a:lnRef>
+          <a:fillRef idx="1">
+            <a:schemeClr val="accent1"/>
+          </a:fillRef>
+          <a:effectRef idx="0">
+            <a:schemeClr val="accent1"/>
+          </a:effectRef>
+          <a:fontRef idx="minor">
+            <a:schemeClr val="lt1"/>
+          </a:fontRef>
+        </p:style>
+        <p:txBody>
+          <a:bodyPr rtlCol="0" anchor="ctr"/>
+          <a:lstStyle/>
+          <a:p>
+            <a:pPr algn="ctr"/>
+            <a:endParaRPr lang="ko-KR" altLang="en-US" dirty="0"/>
+          </a:p>
+        </p:txBody>
+      </p:sp>
+      <p:sp>
+        <p:nvSpPr>
+          <p:cNvPr id="10" name="TextBox 9">
+            <a:extLst>
+              <a:ext uri="{FF2B5EF4-FFF2-40B4-BE49-F238E27FC236}">
+                <a16:creationId xmlns:a16="http://schemas.microsoft.com/office/drawing/2014/main" id="{092FA6E8-C7E4-4826-B91D-93F3C39E18C2}"/>
+              </a:ext>
+            </a:extLst>
+          </p:cNvPr>
+          <p:cNvSpPr txBox="1"/>
+          <p:nvPr/>
+        </p:nvSpPr>
+        <p:spPr>
+          <a:xfrm>
+            <a:off x="2100786" y="1531249"/>
+            <a:ext cx="2038687" cy="323165"/>
+          </a:xfrm>
+          <a:prstGeom prst="rect">
+            <a:avLst/>
+          </a:prstGeom>
+          <a:noFill/>
+        </p:spPr>
+        <p:txBody>
+          <a:bodyPr wrap="square" rtlCol="0">
+            <a:spAutoFit/>
+          </a:bodyPr>
+          <a:lstStyle/>
+          <a:p>
+            <a:r>
+              <a:rPr lang="en-US" altLang="ko-KR" sz="1500" dirty="0"/>
+              <a:t>&lt;</a:t>
+            </a:r>
+            <a:r>
+              <a:rPr lang="ko-KR" altLang="en-US" sz="1500" dirty="0"/>
+              <a:t>우분투 </a:t>
+            </a:r>
+            <a:r>
+              <a:rPr lang="en-US" altLang="ko-KR" sz="1500" dirty="0"/>
+              <a:t>shell </a:t>
+            </a:r>
+            <a:r>
+              <a:rPr lang="ko-KR" altLang="en-US" sz="1500" dirty="0"/>
+              <a:t>창</a:t>
+            </a:r>
+            <a:r>
+              <a:rPr lang="en-US" altLang="ko-KR" sz="1500" dirty="0"/>
+              <a:t>&gt;</a:t>
+            </a:r>
+            <a:endParaRPr lang="ko-KR" altLang="en-US" sz="1500" dirty="0"/>
+          </a:p>
+        </p:txBody>
+      </p:sp>
+    </p:spTree>
+    <p:extLst>
+      <p:ext uri="{BB962C8B-B14F-4D97-AF65-F5344CB8AC3E}">
+        <p14:creationId xmlns:p14="http://schemas.microsoft.com/office/powerpoint/2010/main" val="1119241358"/>
+      </p:ext>
+    </p:extLst>
+  </p:cSld>
+  <p:clrMapOvr>
+    <a:masterClrMapping/>
+  </p:clrMapOvr>
+</p:sld>
+</file>
+
+<file path=ppt/slides/slide11.xml><?xml version="1.0" encoding="utf-8"?>
+<p:sld xmlns:a="http://schemas.openxmlformats.org/drawingml/2006/main" xmlns:r="http://schemas.openxmlformats.org/officeDocument/2006/relationships" xmlns:p="http://schemas.openxmlformats.org/presentationml/2006/main">
+  <p:cSld>
+    <p:spTree>
+      <p:nvGrpSpPr>
+        <p:cNvPr id="1" name=""/>
+        <p:cNvGrpSpPr/>
+        <p:nvPr/>
+      </p:nvGrpSpPr>
+      <p:grpSpPr>
+        <a:xfrm>
+          <a:off x="0" y="0"/>
+          <a:ext cx="0" cy="0"/>
+          <a:chOff x="0" y="0"/>
+          <a:chExt cx="0" cy="0"/>
+        </a:xfrm>
+      </p:grpSpPr>
+      <p:sp>
+        <p:nvSpPr>
+          <p:cNvPr id="2" name="제목 1">
+            <a:extLst>
+              <a:ext uri="{FF2B5EF4-FFF2-40B4-BE49-F238E27FC236}">
+                <a16:creationId xmlns:a16="http://schemas.microsoft.com/office/drawing/2014/main" id="{3687D5C3-FD77-409D-9E6F-3374E84F699D}"/>
+              </a:ext>
+            </a:extLst>
+          </p:cNvPr>
+          <p:cNvSpPr>
+            <a:spLocks noGrp="1"/>
+          </p:cNvSpPr>
+          <p:nvPr>
+            <p:ph type="title"/>
+          </p:nvPr>
+        </p:nvSpPr>
+        <p:spPr>
+          <a:xfrm>
+            <a:off x="720000" y="-36000"/>
+            <a:ext cx="10515600" cy="1325563"/>
+          </a:xfrm>
+        </p:spPr>
+        <p:txBody>
+          <a:bodyPr/>
+          <a:lstStyle/>
+          <a:p>
+            <a:r>
+              <a:rPr lang="ko-KR" altLang="en-US" dirty="0"/>
+              <a:t>세부 내용 </a:t>
+            </a:r>
+            <a:r>
+              <a:rPr lang="en-US" altLang="ko-KR" dirty="0"/>
+              <a:t>- </a:t>
+            </a:r>
+            <a:r>
+              <a:rPr lang="ko-KR" altLang="en-US" dirty="0"/>
+              <a:t>코딩</a:t>
+            </a:r>
+          </a:p>
+        </p:txBody>
+      </p:sp>
+      <p:sp>
+        <p:nvSpPr>
+          <p:cNvPr id="6" name="내용 개체 틀 2">
+            <a:extLst>
+              <a:ext uri="{FF2B5EF4-FFF2-40B4-BE49-F238E27FC236}">
+                <a16:creationId xmlns:a16="http://schemas.microsoft.com/office/drawing/2014/main" id="{58AF069C-4215-4B61-ADD8-25EDD8602F25}"/>
+              </a:ext>
+            </a:extLst>
+          </p:cNvPr>
+          <p:cNvSpPr txBox="1">
+            <a:spLocks/>
+          </p:cNvSpPr>
+          <p:nvPr/>
+        </p:nvSpPr>
+        <p:spPr>
+          <a:xfrm>
+            <a:off x="988295" y="2317742"/>
+            <a:ext cx="5166805" cy="1232466"/>
           </a:xfrm>
           <a:prstGeom prst="rect">
             <a:avLst/>
@@ -3892,23 +4422,229 @@
           </a:lstStyle>
           <a:p>
             <a:r>
-              <a:rPr lang="en-US" altLang="ko-KR" dirty="0" err="1"/>
-              <a:t>twilio</a:t>
+              <a:rPr lang="en-US" altLang="ko-KR" dirty="0"/>
+              <a:t>sms_alert.py </a:t>
             </a:r>
             <a:r>
               <a:rPr lang="ko-KR" altLang="en-US" dirty="0"/>
-              <a:t> 모듈 설치</a:t>
+              <a:t>파일 코딩</a:t>
             </a:r>
             <a:endParaRPr lang="en-US" altLang="ko-KR" dirty="0"/>
+          </a:p>
+          <a:p>
+            <a:pPr marL="0" indent="0">
+              <a:buNone/>
+            </a:pPr>
+            <a:r>
+              <a:rPr lang="en-US" altLang="ko-KR" dirty="0"/>
+              <a:t>(</a:t>
+            </a:r>
+            <a:r>
+              <a:rPr lang="ko-KR" altLang="en-US" dirty="0"/>
+              <a:t>위치</a:t>
+            </a:r>
+            <a:r>
+              <a:rPr lang="en-US" altLang="ko-KR" dirty="0"/>
+              <a:t>: /root)</a:t>
+            </a:r>
+          </a:p>
+        </p:txBody>
+      </p:sp>
+      <p:cxnSp>
+        <p:nvCxnSpPr>
+          <p:cNvPr id="7" name="직선 연결선 6">
+            <a:extLst>
+              <a:ext uri="{FF2B5EF4-FFF2-40B4-BE49-F238E27FC236}">
+                <a16:creationId xmlns:a16="http://schemas.microsoft.com/office/drawing/2014/main" id="{DAC01179-C1A9-4C11-BB31-EC6E28CB3B7E}"/>
+              </a:ext>
+            </a:extLst>
+          </p:cNvPr>
+          <p:cNvCxnSpPr>
+            <a:cxnSpLocks/>
+          </p:cNvCxnSpPr>
+          <p:nvPr/>
+        </p:nvCxnSpPr>
+        <p:spPr>
+          <a:xfrm>
+            <a:off x="838200" y="1091953"/>
+            <a:ext cx="10633800" cy="0"/>
+          </a:xfrm>
+          <a:prstGeom prst="line">
+            <a:avLst/>
+          </a:prstGeom>
+          <a:ln w="25400">
+            <a:solidFill>
+              <a:schemeClr val="bg1">
+                <a:lumMod val="85000"/>
+              </a:schemeClr>
+            </a:solidFill>
+          </a:ln>
+        </p:spPr>
+        <p:style>
+          <a:lnRef idx="1">
+            <a:schemeClr val="accent1"/>
+          </a:lnRef>
+          <a:fillRef idx="0">
+            <a:schemeClr val="accent1"/>
+          </a:fillRef>
+          <a:effectRef idx="0">
+            <a:schemeClr val="accent1"/>
+          </a:effectRef>
+          <a:fontRef idx="minor">
+            <a:schemeClr val="tx1"/>
+          </a:fontRef>
+        </p:style>
+      </p:cxnSp>
+      <p:sp>
+        <p:nvSpPr>
+          <p:cNvPr id="8" name="이등변 삼각형 7">
+            <a:extLst>
+              <a:ext uri="{FF2B5EF4-FFF2-40B4-BE49-F238E27FC236}">
+                <a16:creationId xmlns:a16="http://schemas.microsoft.com/office/drawing/2014/main" id="{E5D0E982-089B-4750-896B-92C3A4307495}"/>
+              </a:ext>
+            </a:extLst>
+          </p:cNvPr>
+          <p:cNvSpPr/>
+          <p:nvPr/>
+        </p:nvSpPr>
+        <p:spPr>
+          <a:xfrm>
+            <a:off x="11651226" y="6318000"/>
+            <a:ext cx="540774" cy="540000"/>
+          </a:xfrm>
+          <a:prstGeom prst="triangle">
+            <a:avLst>
+              <a:gd name="adj" fmla="val 100000"/>
+            </a:avLst>
+          </a:prstGeom>
+          <a:solidFill>
+            <a:srgbClr val="840202"/>
+          </a:solidFill>
+          <a:ln>
+            <a:noFill/>
+          </a:ln>
+        </p:spPr>
+        <p:style>
+          <a:lnRef idx="2">
+            <a:schemeClr val="accent1">
+              <a:shade val="50000"/>
+            </a:schemeClr>
+          </a:lnRef>
+          <a:fillRef idx="1">
+            <a:schemeClr val="accent1"/>
+          </a:fillRef>
+          <a:effectRef idx="0">
+            <a:schemeClr val="accent1"/>
+          </a:effectRef>
+          <a:fontRef idx="minor">
+            <a:schemeClr val="lt1"/>
+          </a:fontRef>
+        </p:style>
+        <p:txBody>
+          <a:bodyPr rtlCol="0" anchor="ctr"/>
+          <a:lstStyle/>
+          <a:p>
+            <a:pPr algn="ctr"/>
+            <a:endParaRPr lang="ko-KR" altLang="en-US" dirty="0"/>
+          </a:p>
+        </p:txBody>
+      </p:sp>
+      <p:sp>
+        <p:nvSpPr>
+          <p:cNvPr id="9" name="이등변 삼각형 8">
+            <a:extLst>
+              <a:ext uri="{FF2B5EF4-FFF2-40B4-BE49-F238E27FC236}">
+                <a16:creationId xmlns:a16="http://schemas.microsoft.com/office/drawing/2014/main" id="{22771CBF-20E3-4D2B-A7EB-06BA5255D5A2}"/>
+              </a:ext>
+            </a:extLst>
+          </p:cNvPr>
+          <p:cNvSpPr/>
+          <p:nvPr/>
+        </p:nvSpPr>
+        <p:spPr>
+          <a:xfrm rot="10800000">
+            <a:off x="0" y="0"/>
+            <a:ext cx="540774" cy="540000"/>
+          </a:xfrm>
+          <a:prstGeom prst="triangle">
+            <a:avLst>
+              <a:gd name="adj" fmla="val 100000"/>
+            </a:avLst>
+          </a:prstGeom>
+          <a:solidFill>
+            <a:srgbClr val="840202"/>
+          </a:solidFill>
+          <a:ln>
+            <a:noFill/>
+          </a:ln>
+        </p:spPr>
+        <p:style>
+          <a:lnRef idx="2">
+            <a:schemeClr val="accent1">
+              <a:shade val="50000"/>
+            </a:schemeClr>
+          </a:lnRef>
+          <a:fillRef idx="1">
+            <a:schemeClr val="accent1"/>
+          </a:fillRef>
+          <a:effectRef idx="0">
+            <a:schemeClr val="accent1"/>
+          </a:effectRef>
+          <a:fontRef idx="minor">
+            <a:schemeClr val="lt1"/>
+          </a:fontRef>
+        </p:style>
+        <p:txBody>
+          <a:bodyPr rtlCol="0" anchor="ctr"/>
+          <a:lstStyle/>
+          <a:p>
+            <a:pPr algn="ctr"/>
+            <a:endParaRPr lang="ko-KR" altLang="en-US" dirty="0"/>
+          </a:p>
+        </p:txBody>
+      </p:sp>
+      <p:sp>
+        <p:nvSpPr>
+          <p:cNvPr id="10" name="TextBox 9">
+            <a:extLst>
+              <a:ext uri="{FF2B5EF4-FFF2-40B4-BE49-F238E27FC236}">
+                <a16:creationId xmlns:a16="http://schemas.microsoft.com/office/drawing/2014/main" id="{43B6CE85-BE92-4517-B3AF-6DA9D5E1BB17}"/>
+              </a:ext>
+            </a:extLst>
+          </p:cNvPr>
+          <p:cNvSpPr txBox="1"/>
+          <p:nvPr/>
+        </p:nvSpPr>
+        <p:spPr>
+          <a:xfrm>
+            <a:off x="7748390" y="90954"/>
+            <a:ext cx="1789683" cy="323165"/>
+          </a:xfrm>
+          <a:prstGeom prst="rect">
+            <a:avLst/>
+          </a:prstGeom>
+          <a:noFill/>
+        </p:spPr>
+        <p:txBody>
+          <a:bodyPr wrap="square" rtlCol="0">
+            <a:spAutoFit/>
+          </a:bodyPr>
+          <a:lstStyle/>
+          <a:p>
+            <a:r>
+              <a:rPr lang="en-US" altLang="ko-KR" sz="1500" dirty="0"/>
+              <a:t>&lt;sms_alert.py&gt;</a:t>
+            </a:r>
+            <a:endParaRPr lang="ko-KR" altLang="en-US" sz="1500" dirty="0"/>
           </a:p>
         </p:txBody>
       </p:sp>
       <p:pic>
         <p:nvPicPr>
-          <p:cNvPr id="7" name="그림 6">
-            <a:extLst>
-              <a:ext uri="{FF2B5EF4-FFF2-40B4-BE49-F238E27FC236}">
-                <a16:creationId xmlns:a16="http://schemas.microsoft.com/office/drawing/2014/main" id="{1C939411-0F09-49FD-8E58-19F89B49CF18}"/>
+          <p:cNvPr id="3" name="그림 2">
+            <a:extLst>
+              <a:ext uri="{FF2B5EF4-FFF2-40B4-BE49-F238E27FC236}">
+                <a16:creationId xmlns:a16="http://schemas.microsoft.com/office/drawing/2014/main" id="{BAF6C2E1-879C-4DBD-9DCA-BE201D69416E}"/>
               </a:ext>
             </a:extLst>
           </p:cNvPr>
@@ -3925,8 +4661,8 @@
         </p:blipFill>
         <p:spPr>
           <a:xfrm>
-            <a:off x="491230" y="1981170"/>
-            <a:ext cx="5257800" cy="4524375"/>
+            <a:off x="5696265" y="441805"/>
+            <a:ext cx="5893935" cy="6383585"/>
           </a:xfrm>
           <a:prstGeom prst="rect">
             <a:avLst/>
@@ -3938,78 +4674,33 @@
           </a:ln>
         </p:spPr>
       </p:pic>
-      <p:cxnSp>
-        <p:nvCxnSpPr>
-          <p:cNvPr id="5" name="직선 연결선 4">
-            <a:extLst>
-              <a:ext uri="{FF2B5EF4-FFF2-40B4-BE49-F238E27FC236}">
-                <a16:creationId xmlns:a16="http://schemas.microsoft.com/office/drawing/2014/main" id="{01D02BC3-4DF6-43B9-8FFF-D3A43AAA0F79}"/>
-              </a:ext>
-            </a:extLst>
-          </p:cNvPr>
-          <p:cNvCxnSpPr>
-            <a:cxnSpLocks/>
-          </p:cNvCxnSpPr>
-          <p:nvPr/>
-        </p:nvCxnSpPr>
-        <p:spPr>
-          <a:xfrm>
-            <a:off x="838200" y="1091953"/>
-            <a:ext cx="10633800" cy="0"/>
-          </a:xfrm>
-          <a:prstGeom prst="line">
+      <p:sp>
+        <p:nvSpPr>
+          <p:cNvPr id="12" name="직사각형 11">
+            <a:extLst>
+              <a:ext uri="{FF2B5EF4-FFF2-40B4-BE49-F238E27FC236}">
+                <a16:creationId xmlns:a16="http://schemas.microsoft.com/office/drawing/2014/main" id="{26FACE42-DEE7-4A41-826E-D3DEB3AE252A}"/>
+              </a:ext>
+            </a:extLst>
+          </p:cNvPr>
+          <p:cNvSpPr/>
+          <p:nvPr/>
+        </p:nvSpPr>
+        <p:spPr>
+          <a:xfrm>
+            <a:off x="7236542" y="2121585"/>
+            <a:ext cx="511849" cy="108154"/>
+          </a:xfrm>
+          <a:prstGeom prst="rect">
             <a:avLst/>
           </a:prstGeom>
-          <a:ln w="25400">
-            <a:solidFill>
-              <a:schemeClr val="bg1">
-                <a:lumMod val="85000"/>
-              </a:schemeClr>
-            </a:solidFill>
-          </a:ln>
-        </p:spPr>
-        <p:style>
-          <a:lnRef idx="1">
-            <a:schemeClr val="accent1"/>
-          </a:lnRef>
-          <a:fillRef idx="0">
-            <a:schemeClr val="accent1"/>
-          </a:fillRef>
-          <a:effectRef idx="0">
-            <a:schemeClr val="accent1"/>
-          </a:effectRef>
-          <a:fontRef idx="minor">
-            <a:schemeClr val="tx1"/>
-          </a:fontRef>
-        </p:style>
-      </p:cxnSp>
-      <p:sp>
-        <p:nvSpPr>
-          <p:cNvPr id="8" name="이등변 삼각형 7">
-            <a:extLst>
-              <a:ext uri="{FF2B5EF4-FFF2-40B4-BE49-F238E27FC236}">
-                <a16:creationId xmlns:a16="http://schemas.microsoft.com/office/drawing/2014/main" id="{4E5CE14E-A08F-46F3-A739-B83E6A31AABB}"/>
-              </a:ext>
-            </a:extLst>
-          </p:cNvPr>
-          <p:cNvSpPr/>
-          <p:nvPr/>
-        </p:nvSpPr>
-        <p:spPr>
-          <a:xfrm>
-            <a:off x="11651226" y="6318000"/>
-            <a:ext cx="540774" cy="540000"/>
-          </a:xfrm>
-          <a:prstGeom prst="triangle">
-            <a:avLst>
-              <a:gd name="adj" fmla="val 100000"/>
-            </a:avLst>
-          </a:prstGeom>
           <a:solidFill>
-            <a:srgbClr val="840202"/>
+            <a:schemeClr val="bg1"/>
           </a:solidFill>
           <a:ln>
-            <a:noFill/>
+            <a:solidFill>
+              <a:schemeClr val="bg1"/>
+            </a:solidFill>
           </a:ln>
         </p:spPr>
         <p:style>
@@ -4033,112 +4724,14 @@
           <a:lstStyle/>
           <a:p>
             <a:pPr algn="ctr"/>
-            <a:endParaRPr lang="ko-KR" altLang="en-US" dirty="0"/>
-          </a:p>
-        </p:txBody>
-      </p:sp>
-      <p:sp>
-        <p:nvSpPr>
-          <p:cNvPr id="9" name="이등변 삼각형 8">
-            <a:extLst>
-              <a:ext uri="{FF2B5EF4-FFF2-40B4-BE49-F238E27FC236}">
-                <a16:creationId xmlns:a16="http://schemas.microsoft.com/office/drawing/2014/main" id="{A794E6E1-7295-4B55-82B5-68E1881635D1}"/>
-              </a:ext>
-            </a:extLst>
-          </p:cNvPr>
-          <p:cNvSpPr/>
-          <p:nvPr/>
-        </p:nvSpPr>
-        <p:spPr>
-          <a:xfrm rot="10800000">
-            <a:off x="0" y="0"/>
-            <a:ext cx="540774" cy="540000"/>
-          </a:xfrm>
-          <a:prstGeom prst="triangle">
-            <a:avLst>
-              <a:gd name="adj" fmla="val 100000"/>
-            </a:avLst>
-          </a:prstGeom>
-          <a:solidFill>
-            <a:srgbClr val="840202"/>
-          </a:solidFill>
-          <a:ln>
-            <a:noFill/>
-          </a:ln>
-        </p:spPr>
-        <p:style>
-          <a:lnRef idx="2">
-            <a:schemeClr val="accent1">
-              <a:shade val="50000"/>
-            </a:schemeClr>
-          </a:lnRef>
-          <a:fillRef idx="1">
-            <a:schemeClr val="accent1"/>
-          </a:fillRef>
-          <a:effectRef idx="0">
-            <a:schemeClr val="accent1"/>
-          </a:effectRef>
-          <a:fontRef idx="minor">
-            <a:schemeClr val="lt1"/>
-          </a:fontRef>
-        </p:style>
-        <p:txBody>
-          <a:bodyPr rtlCol="0" anchor="ctr"/>
-          <a:lstStyle/>
-          <a:p>
-            <a:pPr algn="ctr"/>
-            <a:endParaRPr lang="ko-KR" altLang="en-US" dirty="0"/>
-          </a:p>
-        </p:txBody>
-      </p:sp>
-      <p:sp>
-        <p:nvSpPr>
-          <p:cNvPr id="10" name="TextBox 9">
-            <a:extLst>
-              <a:ext uri="{FF2B5EF4-FFF2-40B4-BE49-F238E27FC236}">
-                <a16:creationId xmlns:a16="http://schemas.microsoft.com/office/drawing/2014/main" id="{092FA6E8-C7E4-4826-B91D-93F3C39E18C2}"/>
-              </a:ext>
-            </a:extLst>
-          </p:cNvPr>
-          <p:cNvSpPr txBox="1"/>
-          <p:nvPr/>
-        </p:nvSpPr>
-        <p:spPr>
-          <a:xfrm>
-            <a:off x="2100786" y="1531249"/>
-            <a:ext cx="2038687" cy="323165"/>
-          </a:xfrm>
-          <a:prstGeom prst="rect">
-            <a:avLst/>
-          </a:prstGeom>
-          <a:noFill/>
-        </p:spPr>
-        <p:txBody>
-          <a:bodyPr wrap="square" rtlCol="0">
-            <a:spAutoFit/>
-          </a:bodyPr>
-          <a:lstStyle/>
-          <a:p>
-            <a:r>
-              <a:rPr lang="en-US" altLang="ko-KR" sz="1500" dirty="0"/>
-              <a:t>&lt;pip install </a:t>
-            </a:r>
-            <a:r>
-              <a:rPr lang="en-US" altLang="ko-KR" sz="1500" dirty="0" err="1"/>
-              <a:t>twilio</a:t>
-            </a:r>
-            <a:r>
-              <a:rPr lang="en-US" altLang="ko-KR" sz="1500" dirty="0"/>
-              <a:t>&gt;</a:t>
-            </a:r>
-            <a:endParaRPr lang="ko-KR" altLang="en-US" sz="1500" dirty="0"/>
+            <a:endParaRPr lang="ko-KR" altLang="en-US"/>
           </a:p>
         </p:txBody>
       </p:sp>
     </p:spTree>
     <p:extLst>
       <p:ext uri="{BB962C8B-B14F-4D97-AF65-F5344CB8AC3E}">
-        <p14:creationId xmlns:p14="http://schemas.microsoft.com/office/powerpoint/2010/main" val="1119241358"/>
+        <p14:creationId xmlns:p14="http://schemas.microsoft.com/office/powerpoint/2010/main" val="466163015"/>
       </p:ext>
     </p:extLst>
   </p:cSld>
@@ -4148,7 +4741,7 @@
 </p:sld>
 </file>
 
-<file path=ppt/slides/slide11.xml><?xml version="1.0" encoding="utf-8"?>
+<file path=ppt/slides/slide12.xml><?xml version="1.0" encoding="utf-8"?>
 <p:sld xmlns:a="http://schemas.openxmlformats.org/drawingml/2006/main" xmlns:r="http://schemas.openxmlformats.org/officeDocument/2006/relationships" xmlns:p="http://schemas.openxmlformats.org/presentationml/2006/main">
   <p:cSld>
     <p:spTree>
@@ -4201,7 +4794,7 @@
             </a:r>
             <a:r>
               <a:rPr lang="ko-KR" altLang="en-US" dirty="0"/>
-              <a:t>코딩</a:t>
+              <a:t>코드</a:t>
             </a:r>
           </a:p>
         </p:txBody>
@@ -4222,7 +4815,7 @@
         </p:nvSpPr>
         <p:spPr>
           <a:xfrm>
-            <a:off x="988295" y="2317742"/>
+            <a:off x="6463034" y="5097314"/>
             <a:ext cx="5166805" cy="1232466"/>
           </a:xfrm>
           <a:prstGeom prst="rect">
@@ -4400,228 +4993,22 @@
           <a:p>
             <a:r>
               <a:rPr lang="en-US" altLang="ko-KR" dirty="0"/>
-              <a:t>sms_alert.py </a:t>
+              <a:t>time.txt </a:t>
             </a:r>
             <a:r>
               <a:rPr lang="ko-KR" altLang="en-US" dirty="0"/>
-              <a:t>파일 코딩</a:t>
+              <a:t>파일 생성 후 로그 시간 붙여넣기</a:t>
             </a:r>
             <a:endParaRPr lang="en-US" altLang="ko-KR" dirty="0"/>
-          </a:p>
-          <a:p>
-            <a:pPr marL="0" indent="0">
-              <a:buNone/>
-            </a:pPr>
-            <a:r>
-              <a:rPr lang="en-US" altLang="ko-KR" dirty="0"/>
-              <a:t>(</a:t>
-            </a:r>
-            <a:r>
-              <a:rPr lang="ko-KR" altLang="en-US" dirty="0"/>
-              <a:t>위치</a:t>
-            </a:r>
-            <a:r>
-              <a:rPr lang="en-US" altLang="ko-KR" dirty="0"/>
-              <a:t>: /root)</a:t>
-            </a:r>
-          </a:p>
-        </p:txBody>
-      </p:sp>
-      <p:cxnSp>
-        <p:nvCxnSpPr>
-          <p:cNvPr id="7" name="직선 연결선 6">
-            <a:extLst>
-              <a:ext uri="{FF2B5EF4-FFF2-40B4-BE49-F238E27FC236}">
-                <a16:creationId xmlns:a16="http://schemas.microsoft.com/office/drawing/2014/main" id="{DAC01179-C1A9-4C11-BB31-EC6E28CB3B7E}"/>
-              </a:ext>
-            </a:extLst>
-          </p:cNvPr>
-          <p:cNvCxnSpPr>
-            <a:cxnSpLocks/>
-          </p:cNvCxnSpPr>
-          <p:nvPr/>
-        </p:nvCxnSpPr>
-        <p:spPr>
-          <a:xfrm>
-            <a:off x="838200" y="1091953"/>
-            <a:ext cx="10633800" cy="0"/>
-          </a:xfrm>
-          <a:prstGeom prst="line">
-            <a:avLst/>
-          </a:prstGeom>
-          <a:ln w="25400">
-            <a:solidFill>
-              <a:schemeClr val="bg1">
-                <a:lumMod val="85000"/>
-              </a:schemeClr>
-            </a:solidFill>
-          </a:ln>
-        </p:spPr>
-        <p:style>
-          <a:lnRef idx="1">
-            <a:schemeClr val="accent1"/>
-          </a:lnRef>
-          <a:fillRef idx="0">
-            <a:schemeClr val="accent1"/>
-          </a:fillRef>
-          <a:effectRef idx="0">
-            <a:schemeClr val="accent1"/>
-          </a:effectRef>
-          <a:fontRef idx="minor">
-            <a:schemeClr val="tx1"/>
-          </a:fontRef>
-        </p:style>
-      </p:cxnSp>
-      <p:sp>
-        <p:nvSpPr>
-          <p:cNvPr id="8" name="이등변 삼각형 7">
-            <a:extLst>
-              <a:ext uri="{FF2B5EF4-FFF2-40B4-BE49-F238E27FC236}">
-                <a16:creationId xmlns:a16="http://schemas.microsoft.com/office/drawing/2014/main" id="{E5D0E982-089B-4750-896B-92C3A4307495}"/>
-              </a:ext>
-            </a:extLst>
-          </p:cNvPr>
-          <p:cNvSpPr/>
-          <p:nvPr/>
-        </p:nvSpPr>
-        <p:spPr>
-          <a:xfrm>
-            <a:off x="11651226" y="6318000"/>
-            <a:ext cx="540774" cy="540000"/>
-          </a:xfrm>
-          <a:prstGeom prst="triangle">
-            <a:avLst>
-              <a:gd name="adj" fmla="val 100000"/>
-            </a:avLst>
-          </a:prstGeom>
-          <a:solidFill>
-            <a:srgbClr val="840202"/>
-          </a:solidFill>
-          <a:ln>
-            <a:noFill/>
-          </a:ln>
-        </p:spPr>
-        <p:style>
-          <a:lnRef idx="2">
-            <a:schemeClr val="accent1">
-              <a:shade val="50000"/>
-            </a:schemeClr>
-          </a:lnRef>
-          <a:fillRef idx="1">
-            <a:schemeClr val="accent1"/>
-          </a:fillRef>
-          <a:effectRef idx="0">
-            <a:schemeClr val="accent1"/>
-          </a:effectRef>
-          <a:fontRef idx="minor">
-            <a:schemeClr val="lt1"/>
-          </a:fontRef>
-        </p:style>
-        <p:txBody>
-          <a:bodyPr rtlCol="0" anchor="ctr"/>
-          <a:lstStyle/>
-          <a:p>
-            <a:pPr algn="ctr"/>
-            <a:endParaRPr lang="ko-KR" altLang="en-US" dirty="0"/>
-          </a:p>
-        </p:txBody>
-      </p:sp>
-      <p:sp>
-        <p:nvSpPr>
-          <p:cNvPr id="9" name="이등변 삼각형 8">
-            <a:extLst>
-              <a:ext uri="{FF2B5EF4-FFF2-40B4-BE49-F238E27FC236}">
-                <a16:creationId xmlns:a16="http://schemas.microsoft.com/office/drawing/2014/main" id="{22771CBF-20E3-4D2B-A7EB-06BA5255D5A2}"/>
-              </a:ext>
-            </a:extLst>
-          </p:cNvPr>
-          <p:cNvSpPr/>
-          <p:nvPr/>
-        </p:nvSpPr>
-        <p:spPr>
-          <a:xfrm rot="10800000">
-            <a:off x="0" y="0"/>
-            <a:ext cx="540774" cy="540000"/>
-          </a:xfrm>
-          <a:prstGeom prst="triangle">
-            <a:avLst>
-              <a:gd name="adj" fmla="val 100000"/>
-            </a:avLst>
-          </a:prstGeom>
-          <a:solidFill>
-            <a:srgbClr val="840202"/>
-          </a:solidFill>
-          <a:ln>
-            <a:noFill/>
-          </a:ln>
-        </p:spPr>
-        <p:style>
-          <a:lnRef idx="2">
-            <a:schemeClr val="accent1">
-              <a:shade val="50000"/>
-            </a:schemeClr>
-          </a:lnRef>
-          <a:fillRef idx="1">
-            <a:schemeClr val="accent1"/>
-          </a:fillRef>
-          <a:effectRef idx="0">
-            <a:schemeClr val="accent1"/>
-          </a:effectRef>
-          <a:fontRef idx="minor">
-            <a:schemeClr val="lt1"/>
-          </a:fontRef>
-        </p:style>
-        <p:txBody>
-          <a:bodyPr rtlCol="0" anchor="ctr"/>
-          <a:lstStyle/>
-          <a:p>
-            <a:pPr algn="ctr"/>
-            <a:endParaRPr lang="ko-KR" altLang="en-US" dirty="0"/>
-          </a:p>
-        </p:txBody>
-      </p:sp>
-      <p:sp>
-        <p:nvSpPr>
-          <p:cNvPr id="10" name="TextBox 9">
-            <a:extLst>
-              <a:ext uri="{FF2B5EF4-FFF2-40B4-BE49-F238E27FC236}">
-                <a16:creationId xmlns:a16="http://schemas.microsoft.com/office/drawing/2014/main" id="{43B6CE85-BE92-4517-B3AF-6DA9D5E1BB17}"/>
-              </a:ext>
-            </a:extLst>
-          </p:cNvPr>
-          <p:cNvSpPr txBox="1"/>
-          <p:nvPr/>
-        </p:nvSpPr>
-        <p:spPr>
-          <a:xfrm>
-            <a:off x="7748390" y="90954"/>
-            <a:ext cx="1789683" cy="323165"/>
-          </a:xfrm>
-          <a:prstGeom prst="rect">
-            <a:avLst/>
-          </a:prstGeom>
-          <a:noFill/>
-        </p:spPr>
-        <p:txBody>
-          <a:bodyPr wrap="square" rtlCol="0">
-            <a:spAutoFit/>
-          </a:bodyPr>
-          <a:lstStyle/>
-          <a:p>
-            <a:r>
-              <a:rPr lang="en-US" altLang="ko-KR" sz="1500" dirty="0"/>
-              <a:t>&lt;sms_alert.py&gt;</a:t>
-            </a:r>
-            <a:endParaRPr lang="ko-KR" altLang="en-US" sz="1500" dirty="0"/>
           </a:p>
         </p:txBody>
       </p:sp>
       <p:pic>
         <p:nvPicPr>
-          <p:cNvPr id="3" name="그림 2">
-            <a:extLst>
-              <a:ext uri="{FF2B5EF4-FFF2-40B4-BE49-F238E27FC236}">
-                <a16:creationId xmlns:a16="http://schemas.microsoft.com/office/drawing/2014/main" id="{BAF6C2E1-879C-4DBD-9DCA-BE201D69416E}"/>
+          <p:cNvPr id="7" name="그림 6">
+            <a:extLst>
+              <a:ext uri="{FF2B5EF4-FFF2-40B4-BE49-F238E27FC236}">
+                <a16:creationId xmlns:a16="http://schemas.microsoft.com/office/drawing/2014/main" id="{6584E66A-5642-4533-80BD-F7D624DEF682}"/>
               </a:ext>
             </a:extLst>
           </p:cNvPr>
@@ -4638,8 +5025,8 @@
         </p:blipFill>
         <p:spPr>
           <a:xfrm>
-            <a:off x="5696265" y="462125"/>
-            <a:ext cx="5893935" cy="6383585"/>
+            <a:off x="1999601" y="4745881"/>
+            <a:ext cx="2724150" cy="1971675"/>
           </a:xfrm>
           <a:prstGeom prst="rect">
             <a:avLst/>
@@ -4651,137 +5038,46 @@
           </a:ln>
         </p:spPr>
       </p:pic>
-      <p:sp>
-        <p:nvSpPr>
-          <p:cNvPr id="12" name="직사각형 11">
-            <a:extLst>
-              <a:ext uri="{FF2B5EF4-FFF2-40B4-BE49-F238E27FC236}">
-                <a16:creationId xmlns:a16="http://schemas.microsoft.com/office/drawing/2014/main" id="{26FACE42-DEE7-4A41-826E-D3DEB3AE252A}"/>
-              </a:ext>
-            </a:extLst>
-          </p:cNvPr>
-          <p:cNvSpPr/>
-          <p:nvPr/>
-        </p:nvSpPr>
-        <p:spPr>
-          <a:xfrm>
-            <a:off x="7236542" y="2121585"/>
-            <a:ext cx="511849" cy="108154"/>
+      <p:pic>
+        <p:nvPicPr>
+          <p:cNvPr id="8" name="그림 7">
+            <a:extLst>
+              <a:ext uri="{FF2B5EF4-FFF2-40B4-BE49-F238E27FC236}">
+                <a16:creationId xmlns:a16="http://schemas.microsoft.com/office/drawing/2014/main" id="{91B03C98-57EF-4AF3-A7F2-296FEEF68703}"/>
+              </a:ext>
+            </a:extLst>
+          </p:cNvPr>
+          <p:cNvPicPr>
+            <a:picLocks noChangeAspect="1"/>
+          </p:cNvPicPr>
+          <p:nvPr/>
+        </p:nvPicPr>
+        <p:blipFill rotWithShape="1">
+          <a:blip r:embed="rId3"/>
+          <a:srcRect b="19141"/>
+          <a:stretch/>
+        </p:blipFill>
+        <p:spPr>
+          <a:xfrm>
+            <a:off x="689914" y="1933829"/>
+            <a:ext cx="5343525" cy="1971675"/>
           </a:xfrm>
           <a:prstGeom prst="rect">
             <a:avLst/>
           </a:prstGeom>
-          <a:solidFill>
-            <a:schemeClr val="bg1"/>
-          </a:solidFill>
           <a:ln>
             <a:solidFill>
-              <a:schemeClr val="bg1"/>
+              <a:schemeClr val="tx1"/>
             </a:solidFill>
           </a:ln>
         </p:spPr>
-        <p:style>
-          <a:lnRef idx="2">
-            <a:schemeClr val="accent1">
-              <a:shade val="50000"/>
-            </a:schemeClr>
-          </a:lnRef>
-          <a:fillRef idx="1">
-            <a:schemeClr val="accent1"/>
-          </a:fillRef>
-          <a:effectRef idx="0">
-            <a:schemeClr val="accent1"/>
-          </a:effectRef>
-          <a:fontRef idx="minor">
-            <a:schemeClr val="lt1"/>
-          </a:fontRef>
-        </p:style>
-        <p:txBody>
-          <a:bodyPr rtlCol="0" anchor="ctr"/>
-          <a:lstStyle/>
-          <a:p>
-            <a:pPr algn="ctr"/>
-            <a:endParaRPr lang="ko-KR" altLang="en-US"/>
-          </a:p>
-        </p:txBody>
-      </p:sp>
-    </p:spTree>
-    <p:extLst>
-      <p:ext uri="{BB962C8B-B14F-4D97-AF65-F5344CB8AC3E}">
-        <p14:creationId xmlns:p14="http://schemas.microsoft.com/office/powerpoint/2010/main" val="466163015"/>
-      </p:ext>
-    </p:extLst>
-  </p:cSld>
-  <p:clrMapOvr>
-    <a:masterClrMapping/>
-  </p:clrMapOvr>
-</p:sld>
-</file>
-
-<file path=ppt/slides/slide12.xml><?xml version="1.0" encoding="utf-8"?>
-<p:sld xmlns:a="http://schemas.openxmlformats.org/drawingml/2006/main" xmlns:r="http://schemas.openxmlformats.org/officeDocument/2006/relationships" xmlns:p="http://schemas.openxmlformats.org/presentationml/2006/main">
-  <p:cSld>
-    <p:spTree>
-      <p:nvGrpSpPr>
-        <p:cNvPr id="1" name=""/>
-        <p:cNvGrpSpPr/>
-        <p:nvPr/>
-      </p:nvGrpSpPr>
-      <p:grpSpPr>
-        <a:xfrm>
-          <a:off x="0" y="0"/>
-          <a:ext cx="0" cy="0"/>
-          <a:chOff x="0" y="0"/>
-          <a:chExt cx="0" cy="0"/>
-        </a:xfrm>
-      </p:grpSpPr>
-      <p:sp>
-        <p:nvSpPr>
-          <p:cNvPr id="2" name="제목 1">
-            <a:extLst>
-              <a:ext uri="{FF2B5EF4-FFF2-40B4-BE49-F238E27FC236}">
-                <a16:creationId xmlns:a16="http://schemas.microsoft.com/office/drawing/2014/main" id="{3687D5C3-FD77-409D-9E6F-3374E84F699D}"/>
-              </a:ext>
-            </a:extLst>
-          </p:cNvPr>
-          <p:cNvSpPr>
-            <a:spLocks noGrp="1"/>
-          </p:cNvSpPr>
-          <p:nvPr>
-            <p:ph type="title"/>
-          </p:nvPr>
-        </p:nvSpPr>
-        <p:spPr>
-          <a:xfrm>
-            <a:off x="720000" y="-36000"/>
-            <a:ext cx="10515600" cy="1325563"/>
-          </a:xfrm>
-        </p:spPr>
-        <p:txBody>
-          <a:bodyPr/>
-          <a:lstStyle/>
-          <a:p>
-            <a:r>
-              <a:rPr lang="ko-KR" altLang="en-US" dirty="0"/>
-              <a:t>세부 내용 </a:t>
-            </a:r>
-            <a:r>
-              <a:rPr lang="en-US" altLang="ko-KR" dirty="0"/>
-              <a:t>- </a:t>
-            </a:r>
-            <a:r>
-              <a:rPr lang="ko-KR" altLang="en-US" dirty="0"/>
-              <a:t>코드</a:t>
-            </a:r>
-          </a:p>
-        </p:txBody>
-      </p:sp>
-      <p:sp>
-        <p:nvSpPr>
-          <p:cNvPr id="6" name="내용 개체 틀 2">
-            <a:extLst>
-              <a:ext uri="{FF2B5EF4-FFF2-40B4-BE49-F238E27FC236}">
-                <a16:creationId xmlns:a16="http://schemas.microsoft.com/office/drawing/2014/main" id="{58AF069C-4215-4B61-ADD8-25EDD8602F25}"/>
+      </p:pic>
+      <p:sp>
+        <p:nvSpPr>
+          <p:cNvPr id="10" name="내용 개체 틀 2">
+            <a:extLst>
+              <a:ext uri="{FF2B5EF4-FFF2-40B4-BE49-F238E27FC236}">
+                <a16:creationId xmlns:a16="http://schemas.microsoft.com/office/drawing/2014/main" id="{CEF90079-3D4E-4112-BCBB-B7D34BC940AA}"/>
               </a:ext>
             </a:extLst>
           </p:cNvPr>
@@ -4792,7 +5088,7 @@
         </p:nvSpPr>
         <p:spPr>
           <a:xfrm>
-            <a:off x="6463034" y="5097314"/>
+            <a:off x="6463033" y="2417516"/>
             <a:ext cx="5166805" cy="1232466"/>
           </a:xfrm>
           <a:prstGeom prst="rect">
@@ -4970,13 +5266,429 @@
           <a:p>
             <a:r>
               <a:rPr lang="en-US" altLang="ko-KR" dirty="0"/>
-              <a:t>time.txt </a:t>
+              <a:t>Snort/alert </a:t>
             </a:r>
             <a:r>
               <a:rPr lang="ko-KR" altLang="en-US" dirty="0"/>
-              <a:t>파일 생성 후 로그 시간 붙여넣기</a:t>
+              <a:t>로그의 시간</a:t>
+            </a:r>
+            <a:r>
+              <a:rPr lang="en-US" altLang="ko-KR" dirty="0"/>
+              <a:t> </a:t>
+            </a:r>
+            <a:r>
+              <a:rPr lang="ko-KR" altLang="en-US" dirty="0"/>
+              <a:t>부분 복사</a:t>
             </a:r>
             <a:endParaRPr lang="en-US" altLang="ko-KR" dirty="0"/>
+          </a:p>
+        </p:txBody>
+      </p:sp>
+      <p:sp>
+        <p:nvSpPr>
+          <p:cNvPr id="11" name="직사각형 10">
+            <a:extLst>
+              <a:ext uri="{FF2B5EF4-FFF2-40B4-BE49-F238E27FC236}">
+                <a16:creationId xmlns:a16="http://schemas.microsoft.com/office/drawing/2014/main" id="{043B95E2-228C-4FC9-92D3-A0E9C2049956}"/>
+              </a:ext>
+            </a:extLst>
+          </p:cNvPr>
+          <p:cNvSpPr/>
+          <p:nvPr/>
+        </p:nvSpPr>
+        <p:spPr>
+          <a:xfrm>
+            <a:off x="835743" y="2038224"/>
+            <a:ext cx="2369574" cy="311686"/>
+          </a:xfrm>
+          <a:prstGeom prst="rect">
+            <a:avLst/>
+          </a:prstGeom>
+          <a:noFill/>
+          <a:ln w="25400">
+            <a:solidFill>
+              <a:srgbClr val="FF0000"/>
+            </a:solidFill>
+          </a:ln>
+        </p:spPr>
+        <p:style>
+          <a:lnRef idx="2">
+            <a:schemeClr val="accent1">
+              <a:shade val="50000"/>
+            </a:schemeClr>
+          </a:lnRef>
+          <a:fillRef idx="1">
+            <a:schemeClr val="accent1"/>
+          </a:fillRef>
+          <a:effectRef idx="0">
+            <a:schemeClr val="accent1"/>
+          </a:effectRef>
+          <a:fontRef idx="minor">
+            <a:schemeClr val="lt1"/>
+          </a:fontRef>
+        </p:style>
+        <p:txBody>
+          <a:bodyPr rtlCol="0" anchor="ctr"/>
+          <a:lstStyle/>
+          <a:p>
+            <a:pPr algn="ctr"/>
+            <a:endParaRPr lang="ko-KR" altLang="en-US"/>
+          </a:p>
+        </p:txBody>
+      </p:sp>
+      <p:sp>
+        <p:nvSpPr>
+          <p:cNvPr id="12" name="직사각형 11">
+            <a:extLst>
+              <a:ext uri="{FF2B5EF4-FFF2-40B4-BE49-F238E27FC236}">
+                <a16:creationId xmlns:a16="http://schemas.microsoft.com/office/drawing/2014/main" id="{D5436CA7-9FA2-48D4-B150-112CA1025C6B}"/>
+              </a:ext>
+            </a:extLst>
+          </p:cNvPr>
+          <p:cNvSpPr/>
+          <p:nvPr/>
+        </p:nvSpPr>
+        <p:spPr>
+          <a:xfrm>
+            <a:off x="2121952" y="5204708"/>
+            <a:ext cx="2459880" cy="370182"/>
+          </a:xfrm>
+          <a:prstGeom prst="rect">
+            <a:avLst/>
+          </a:prstGeom>
+          <a:noFill/>
+          <a:ln w="25400">
+            <a:solidFill>
+              <a:srgbClr val="FF0000"/>
+            </a:solidFill>
+          </a:ln>
+        </p:spPr>
+        <p:style>
+          <a:lnRef idx="2">
+            <a:schemeClr val="accent1">
+              <a:shade val="50000"/>
+            </a:schemeClr>
+          </a:lnRef>
+          <a:fillRef idx="1">
+            <a:schemeClr val="accent1"/>
+          </a:fillRef>
+          <a:effectRef idx="0">
+            <a:schemeClr val="accent1"/>
+          </a:effectRef>
+          <a:fontRef idx="minor">
+            <a:schemeClr val="lt1"/>
+          </a:fontRef>
+        </p:style>
+        <p:txBody>
+          <a:bodyPr rtlCol="0" anchor="ctr"/>
+          <a:lstStyle/>
+          <a:p>
+            <a:pPr algn="ctr"/>
+            <a:endParaRPr lang="ko-KR" altLang="en-US"/>
+          </a:p>
+        </p:txBody>
+      </p:sp>
+      <p:cxnSp>
+        <p:nvCxnSpPr>
+          <p:cNvPr id="13" name="직선 연결선 12">
+            <a:extLst>
+              <a:ext uri="{FF2B5EF4-FFF2-40B4-BE49-F238E27FC236}">
+                <a16:creationId xmlns:a16="http://schemas.microsoft.com/office/drawing/2014/main" id="{FD4CBF78-11AD-40F9-9498-8D772922C641}"/>
+              </a:ext>
+            </a:extLst>
+          </p:cNvPr>
+          <p:cNvCxnSpPr>
+            <a:cxnSpLocks/>
+          </p:cNvCxnSpPr>
+          <p:nvPr/>
+        </p:nvCxnSpPr>
+        <p:spPr>
+          <a:xfrm>
+            <a:off x="838200" y="1091953"/>
+            <a:ext cx="10633800" cy="0"/>
+          </a:xfrm>
+          <a:prstGeom prst="line">
+            <a:avLst/>
+          </a:prstGeom>
+          <a:ln w="25400">
+            <a:solidFill>
+              <a:schemeClr val="bg1">
+                <a:lumMod val="85000"/>
+              </a:schemeClr>
+            </a:solidFill>
+          </a:ln>
+        </p:spPr>
+        <p:style>
+          <a:lnRef idx="1">
+            <a:schemeClr val="accent1"/>
+          </a:lnRef>
+          <a:fillRef idx="0">
+            <a:schemeClr val="accent1"/>
+          </a:fillRef>
+          <a:effectRef idx="0">
+            <a:schemeClr val="accent1"/>
+          </a:effectRef>
+          <a:fontRef idx="minor">
+            <a:schemeClr val="tx1"/>
+          </a:fontRef>
+        </p:style>
+      </p:cxnSp>
+      <p:sp>
+        <p:nvSpPr>
+          <p:cNvPr id="14" name="이등변 삼각형 13">
+            <a:extLst>
+              <a:ext uri="{FF2B5EF4-FFF2-40B4-BE49-F238E27FC236}">
+                <a16:creationId xmlns:a16="http://schemas.microsoft.com/office/drawing/2014/main" id="{FB3DB263-37A2-4ED7-A695-D9D9326ED582}"/>
+              </a:ext>
+            </a:extLst>
+          </p:cNvPr>
+          <p:cNvSpPr/>
+          <p:nvPr/>
+        </p:nvSpPr>
+        <p:spPr>
+          <a:xfrm>
+            <a:off x="11651226" y="6318000"/>
+            <a:ext cx="540774" cy="540000"/>
+          </a:xfrm>
+          <a:prstGeom prst="triangle">
+            <a:avLst>
+              <a:gd name="adj" fmla="val 100000"/>
+            </a:avLst>
+          </a:prstGeom>
+          <a:solidFill>
+            <a:srgbClr val="840202"/>
+          </a:solidFill>
+          <a:ln>
+            <a:noFill/>
+          </a:ln>
+        </p:spPr>
+        <p:style>
+          <a:lnRef idx="2">
+            <a:schemeClr val="accent1">
+              <a:shade val="50000"/>
+            </a:schemeClr>
+          </a:lnRef>
+          <a:fillRef idx="1">
+            <a:schemeClr val="accent1"/>
+          </a:fillRef>
+          <a:effectRef idx="0">
+            <a:schemeClr val="accent1"/>
+          </a:effectRef>
+          <a:fontRef idx="minor">
+            <a:schemeClr val="lt1"/>
+          </a:fontRef>
+        </p:style>
+        <p:txBody>
+          <a:bodyPr rtlCol="0" anchor="ctr"/>
+          <a:lstStyle/>
+          <a:p>
+            <a:pPr algn="ctr"/>
+            <a:endParaRPr lang="ko-KR" altLang="en-US" dirty="0"/>
+          </a:p>
+        </p:txBody>
+      </p:sp>
+      <p:sp>
+        <p:nvSpPr>
+          <p:cNvPr id="15" name="이등변 삼각형 14">
+            <a:extLst>
+              <a:ext uri="{FF2B5EF4-FFF2-40B4-BE49-F238E27FC236}">
+                <a16:creationId xmlns:a16="http://schemas.microsoft.com/office/drawing/2014/main" id="{EB7B70B9-AC78-4A9D-9DB8-D660CB57EC11}"/>
+              </a:ext>
+            </a:extLst>
+          </p:cNvPr>
+          <p:cNvSpPr/>
+          <p:nvPr/>
+        </p:nvSpPr>
+        <p:spPr>
+          <a:xfrm rot="10800000">
+            <a:off x="0" y="0"/>
+            <a:ext cx="540774" cy="540000"/>
+          </a:xfrm>
+          <a:prstGeom prst="triangle">
+            <a:avLst>
+              <a:gd name="adj" fmla="val 100000"/>
+            </a:avLst>
+          </a:prstGeom>
+          <a:solidFill>
+            <a:srgbClr val="840202"/>
+          </a:solidFill>
+          <a:ln>
+            <a:noFill/>
+          </a:ln>
+        </p:spPr>
+        <p:style>
+          <a:lnRef idx="2">
+            <a:schemeClr val="accent1">
+              <a:shade val="50000"/>
+            </a:schemeClr>
+          </a:lnRef>
+          <a:fillRef idx="1">
+            <a:schemeClr val="accent1"/>
+          </a:fillRef>
+          <a:effectRef idx="0">
+            <a:schemeClr val="accent1"/>
+          </a:effectRef>
+          <a:fontRef idx="minor">
+            <a:schemeClr val="lt1"/>
+          </a:fontRef>
+        </p:style>
+        <p:txBody>
+          <a:bodyPr rtlCol="0" anchor="ctr"/>
+          <a:lstStyle/>
+          <a:p>
+            <a:pPr algn="ctr"/>
+            <a:endParaRPr lang="ko-KR" altLang="en-US" dirty="0"/>
+          </a:p>
+        </p:txBody>
+      </p:sp>
+      <p:sp>
+        <p:nvSpPr>
+          <p:cNvPr id="18" name="TextBox 17">
+            <a:extLst>
+              <a:ext uri="{FF2B5EF4-FFF2-40B4-BE49-F238E27FC236}">
+                <a16:creationId xmlns:a16="http://schemas.microsoft.com/office/drawing/2014/main" id="{3DE489FC-6167-4272-8560-A3DA78296501}"/>
+              </a:ext>
+            </a:extLst>
+          </p:cNvPr>
+          <p:cNvSpPr txBox="1"/>
+          <p:nvPr/>
+        </p:nvSpPr>
+        <p:spPr>
+          <a:xfrm>
+            <a:off x="2550966" y="4315254"/>
+            <a:ext cx="1621420" cy="323165"/>
+          </a:xfrm>
+          <a:prstGeom prst="rect">
+            <a:avLst/>
+          </a:prstGeom>
+          <a:noFill/>
+        </p:spPr>
+        <p:txBody>
+          <a:bodyPr wrap="square" rtlCol="0">
+            <a:spAutoFit/>
+          </a:bodyPr>
+          <a:lstStyle/>
+          <a:p>
+            <a:r>
+              <a:rPr lang="en-US" altLang="ko-KR" sz="1500" dirty="0"/>
+              <a:t>&lt;time.txt </a:t>
+            </a:r>
+            <a:r>
+              <a:rPr lang="ko-KR" altLang="en-US" sz="1500" dirty="0"/>
+              <a:t>파일</a:t>
+            </a:r>
+            <a:r>
+              <a:rPr lang="en-US" altLang="ko-KR" sz="1500" dirty="0"/>
+              <a:t>&gt;</a:t>
+            </a:r>
+            <a:endParaRPr lang="ko-KR" altLang="en-US" sz="1500" dirty="0"/>
+          </a:p>
+        </p:txBody>
+      </p:sp>
+      <p:sp>
+        <p:nvSpPr>
+          <p:cNvPr id="17" name="TextBox 16">
+            <a:extLst>
+              <a:ext uri="{FF2B5EF4-FFF2-40B4-BE49-F238E27FC236}">
+                <a16:creationId xmlns:a16="http://schemas.microsoft.com/office/drawing/2014/main" id="{D0A59F98-C518-4833-A871-1DBF0308E109}"/>
+              </a:ext>
+            </a:extLst>
+          </p:cNvPr>
+          <p:cNvSpPr txBox="1"/>
+          <p:nvPr/>
+        </p:nvSpPr>
+        <p:spPr>
+          <a:xfrm>
+            <a:off x="2628712" y="1501704"/>
+            <a:ext cx="1789683" cy="323165"/>
+          </a:xfrm>
+          <a:prstGeom prst="rect">
+            <a:avLst/>
+          </a:prstGeom>
+          <a:noFill/>
+        </p:spPr>
+        <p:txBody>
+          <a:bodyPr wrap="square" rtlCol="0">
+            <a:spAutoFit/>
+          </a:bodyPr>
+          <a:lstStyle/>
+          <a:p>
+            <a:r>
+              <a:rPr lang="en-US" altLang="ko-KR" sz="1500" dirty="0"/>
+              <a:t>&lt;snort alert log&gt;</a:t>
+            </a:r>
+            <a:endParaRPr lang="ko-KR" altLang="en-US" sz="1500" dirty="0"/>
+          </a:p>
+        </p:txBody>
+      </p:sp>
+    </p:spTree>
+    <p:extLst>
+      <p:ext uri="{BB962C8B-B14F-4D97-AF65-F5344CB8AC3E}">
+        <p14:creationId xmlns:p14="http://schemas.microsoft.com/office/powerpoint/2010/main" val="2928021254"/>
+      </p:ext>
+    </p:extLst>
+  </p:cSld>
+  <p:clrMapOvr>
+    <a:masterClrMapping/>
+  </p:clrMapOvr>
+</p:sld>
+</file>
+
+<file path=ppt/slides/slide13.xml><?xml version="1.0" encoding="utf-8"?>
+<p:sld xmlns:a="http://schemas.openxmlformats.org/drawingml/2006/main" xmlns:r="http://schemas.openxmlformats.org/officeDocument/2006/relationships" xmlns:p="http://schemas.openxmlformats.org/presentationml/2006/main">
+  <p:cSld>
+    <p:spTree>
+      <p:nvGrpSpPr>
+        <p:cNvPr id="1" name=""/>
+        <p:cNvGrpSpPr/>
+        <p:nvPr/>
+      </p:nvGrpSpPr>
+      <p:grpSpPr>
+        <a:xfrm>
+          <a:off x="0" y="0"/>
+          <a:ext cx="0" cy="0"/>
+          <a:chOff x="0" y="0"/>
+          <a:chExt cx="0" cy="0"/>
+        </a:xfrm>
+      </p:grpSpPr>
+      <p:sp>
+        <p:nvSpPr>
+          <p:cNvPr id="2" name="제목 1">
+            <a:extLst>
+              <a:ext uri="{FF2B5EF4-FFF2-40B4-BE49-F238E27FC236}">
+                <a16:creationId xmlns:a16="http://schemas.microsoft.com/office/drawing/2014/main" id="{3687D5C3-FD77-409D-9E6F-3374E84F699D}"/>
+              </a:ext>
+            </a:extLst>
+          </p:cNvPr>
+          <p:cNvSpPr>
+            <a:spLocks noGrp="1"/>
+          </p:cNvSpPr>
+          <p:nvPr>
+            <p:ph type="title"/>
+          </p:nvPr>
+        </p:nvSpPr>
+        <p:spPr>
+          <a:xfrm>
+            <a:off x="720000" y="-36000"/>
+            <a:ext cx="10515600" cy="1325563"/>
+          </a:xfrm>
+        </p:spPr>
+        <p:txBody>
+          <a:bodyPr/>
+          <a:lstStyle/>
+          <a:p>
+            <a:r>
+              <a:rPr lang="ko-KR" altLang="en-US" dirty="0"/>
+              <a:t>세부 내용 </a:t>
+            </a:r>
+            <a:r>
+              <a:rPr lang="en-US" altLang="ko-KR" dirty="0"/>
+              <a:t>- </a:t>
+            </a:r>
+            <a:r>
+              <a:rPr lang="ko-KR" altLang="en-US" dirty="0"/>
+              <a:t>코드</a:t>
+            </a:r>
           </a:p>
         </p:txBody>
       </p:sp>
@@ -5051,6 +5763,922 @@
       </p:pic>
       <p:sp>
         <p:nvSpPr>
+          <p:cNvPr id="11" name="직사각형 10">
+            <a:extLst>
+              <a:ext uri="{FF2B5EF4-FFF2-40B4-BE49-F238E27FC236}">
+                <a16:creationId xmlns:a16="http://schemas.microsoft.com/office/drawing/2014/main" id="{043B95E2-228C-4FC9-92D3-A0E9C2049956}"/>
+              </a:ext>
+            </a:extLst>
+          </p:cNvPr>
+          <p:cNvSpPr/>
+          <p:nvPr/>
+        </p:nvSpPr>
+        <p:spPr>
+          <a:xfrm>
+            <a:off x="835743" y="2038224"/>
+            <a:ext cx="2369574" cy="311686"/>
+          </a:xfrm>
+          <a:prstGeom prst="rect">
+            <a:avLst/>
+          </a:prstGeom>
+          <a:noFill/>
+          <a:ln w="25400">
+            <a:solidFill>
+              <a:srgbClr val="FF0000"/>
+            </a:solidFill>
+          </a:ln>
+        </p:spPr>
+        <p:style>
+          <a:lnRef idx="2">
+            <a:schemeClr val="accent1">
+              <a:shade val="50000"/>
+            </a:schemeClr>
+          </a:lnRef>
+          <a:fillRef idx="1">
+            <a:schemeClr val="accent1"/>
+          </a:fillRef>
+          <a:effectRef idx="0">
+            <a:schemeClr val="accent1"/>
+          </a:effectRef>
+          <a:fontRef idx="minor">
+            <a:schemeClr val="lt1"/>
+          </a:fontRef>
+        </p:style>
+        <p:txBody>
+          <a:bodyPr rtlCol="0" anchor="ctr"/>
+          <a:lstStyle/>
+          <a:p>
+            <a:pPr algn="ctr"/>
+            <a:endParaRPr lang="ko-KR" altLang="en-US"/>
+          </a:p>
+        </p:txBody>
+      </p:sp>
+      <p:sp>
+        <p:nvSpPr>
+          <p:cNvPr id="12" name="직사각형 11">
+            <a:extLst>
+              <a:ext uri="{FF2B5EF4-FFF2-40B4-BE49-F238E27FC236}">
+                <a16:creationId xmlns:a16="http://schemas.microsoft.com/office/drawing/2014/main" id="{D5436CA7-9FA2-48D4-B150-112CA1025C6B}"/>
+              </a:ext>
+            </a:extLst>
+          </p:cNvPr>
+          <p:cNvSpPr/>
+          <p:nvPr/>
+        </p:nvSpPr>
+        <p:spPr>
+          <a:xfrm>
+            <a:off x="2121952" y="5204708"/>
+            <a:ext cx="2459880" cy="370182"/>
+          </a:xfrm>
+          <a:prstGeom prst="rect">
+            <a:avLst/>
+          </a:prstGeom>
+          <a:noFill/>
+          <a:ln w="25400">
+            <a:solidFill>
+              <a:srgbClr val="FF0000"/>
+            </a:solidFill>
+          </a:ln>
+        </p:spPr>
+        <p:style>
+          <a:lnRef idx="2">
+            <a:schemeClr val="accent1">
+              <a:shade val="50000"/>
+            </a:schemeClr>
+          </a:lnRef>
+          <a:fillRef idx="1">
+            <a:schemeClr val="accent1"/>
+          </a:fillRef>
+          <a:effectRef idx="0">
+            <a:schemeClr val="accent1"/>
+          </a:effectRef>
+          <a:fontRef idx="minor">
+            <a:schemeClr val="lt1"/>
+          </a:fontRef>
+        </p:style>
+        <p:txBody>
+          <a:bodyPr rtlCol="0" anchor="ctr"/>
+          <a:lstStyle/>
+          <a:p>
+            <a:pPr algn="ctr"/>
+            <a:endParaRPr lang="ko-KR" altLang="en-US"/>
+          </a:p>
+        </p:txBody>
+      </p:sp>
+      <p:cxnSp>
+        <p:nvCxnSpPr>
+          <p:cNvPr id="13" name="직선 연결선 12">
+            <a:extLst>
+              <a:ext uri="{FF2B5EF4-FFF2-40B4-BE49-F238E27FC236}">
+                <a16:creationId xmlns:a16="http://schemas.microsoft.com/office/drawing/2014/main" id="{FD4CBF78-11AD-40F9-9498-8D772922C641}"/>
+              </a:ext>
+            </a:extLst>
+          </p:cNvPr>
+          <p:cNvCxnSpPr>
+            <a:cxnSpLocks/>
+          </p:cNvCxnSpPr>
+          <p:nvPr/>
+        </p:nvCxnSpPr>
+        <p:spPr>
+          <a:xfrm>
+            <a:off x="838200" y="1091953"/>
+            <a:ext cx="10633800" cy="0"/>
+          </a:xfrm>
+          <a:prstGeom prst="line">
+            <a:avLst/>
+          </a:prstGeom>
+          <a:ln w="25400">
+            <a:solidFill>
+              <a:schemeClr val="bg1">
+                <a:lumMod val="85000"/>
+              </a:schemeClr>
+            </a:solidFill>
+          </a:ln>
+        </p:spPr>
+        <p:style>
+          <a:lnRef idx="1">
+            <a:schemeClr val="accent1"/>
+          </a:lnRef>
+          <a:fillRef idx="0">
+            <a:schemeClr val="accent1"/>
+          </a:fillRef>
+          <a:effectRef idx="0">
+            <a:schemeClr val="accent1"/>
+          </a:effectRef>
+          <a:fontRef idx="minor">
+            <a:schemeClr val="tx1"/>
+          </a:fontRef>
+        </p:style>
+      </p:cxnSp>
+      <p:sp>
+        <p:nvSpPr>
+          <p:cNvPr id="14" name="이등변 삼각형 13">
+            <a:extLst>
+              <a:ext uri="{FF2B5EF4-FFF2-40B4-BE49-F238E27FC236}">
+                <a16:creationId xmlns:a16="http://schemas.microsoft.com/office/drawing/2014/main" id="{FB3DB263-37A2-4ED7-A695-D9D9326ED582}"/>
+              </a:ext>
+            </a:extLst>
+          </p:cNvPr>
+          <p:cNvSpPr/>
+          <p:nvPr/>
+        </p:nvSpPr>
+        <p:spPr>
+          <a:xfrm>
+            <a:off x="11651226" y="6318000"/>
+            <a:ext cx="540774" cy="540000"/>
+          </a:xfrm>
+          <a:prstGeom prst="triangle">
+            <a:avLst>
+              <a:gd name="adj" fmla="val 100000"/>
+            </a:avLst>
+          </a:prstGeom>
+          <a:solidFill>
+            <a:srgbClr val="840202"/>
+          </a:solidFill>
+          <a:ln>
+            <a:noFill/>
+          </a:ln>
+        </p:spPr>
+        <p:style>
+          <a:lnRef idx="2">
+            <a:schemeClr val="accent1">
+              <a:shade val="50000"/>
+            </a:schemeClr>
+          </a:lnRef>
+          <a:fillRef idx="1">
+            <a:schemeClr val="accent1"/>
+          </a:fillRef>
+          <a:effectRef idx="0">
+            <a:schemeClr val="accent1"/>
+          </a:effectRef>
+          <a:fontRef idx="minor">
+            <a:schemeClr val="lt1"/>
+          </a:fontRef>
+        </p:style>
+        <p:txBody>
+          <a:bodyPr rtlCol="0" anchor="ctr"/>
+          <a:lstStyle/>
+          <a:p>
+            <a:pPr algn="ctr"/>
+            <a:endParaRPr lang="ko-KR" altLang="en-US" dirty="0"/>
+          </a:p>
+        </p:txBody>
+      </p:sp>
+      <p:sp>
+        <p:nvSpPr>
+          <p:cNvPr id="15" name="이등변 삼각형 14">
+            <a:extLst>
+              <a:ext uri="{FF2B5EF4-FFF2-40B4-BE49-F238E27FC236}">
+                <a16:creationId xmlns:a16="http://schemas.microsoft.com/office/drawing/2014/main" id="{EB7B70B9-AC78-4A9D-9DB8-D660CB57EC11}"/>
+              </a:ext>
+            </a:extLst>
+          </p:cNvPr>
+          <p:cNvSpPr/>
+          <p:nvPr/>
+        </p:nvSpPr>
+        <p:spPr>
+          <a:xfrm rot="10800000">
+            <a:off x="0" y="0"/>
+            <a:ext cx="540774" cy="540000"/>
+          </a:xfrm>
+          <a:prstGeom prst="triangle">
+            <a:avLst>
+              <a:gd name="adj" fmla="val 100000"/>
+            </a:avLst>
+          </a:prstGeom>
+          <a:solidFill>
+            <a:srgbClr val="840202"/>
+          </a:solidFill>
+          <a:ln>
+            <a:noFill/>
+          </a:ln>
+        </p:spPr>
+        <p:style>
+          <a:lnRef idx="2">
+            <a:schemeClr val="accent1">
+              <a:shade val="50000"/>
+            </a:schemeClr>
+          </a:lnRef>
+          <a:fillRef idx="1">
+            <a:schemeClr val="accent1"/>
+          </a:fillRef>
+          <a:effectRef idx="0">
+            <a:schemeClr val="accent1"/>
+          </a:effectRef>
+          <a:fontRef idx="minor">
+            <a:schemeClr val="lt1"/>
+          </a:fontRef>
+        </p:style>
+        <p:txBody>
+          <a:bodyPr rtlCol="0" anchor="ctr"/>
+          <a:lstStyle/>
+          <a:p>
+            <a:pPr algn="ctr"/>
+            <a:endParaRPr lang="ko-KR" altLang="en-US" dirty="0"/>
+          </a:p>
+        </p:txBody>
+      </p:sp>
+      <p:sp>
+        <p:nvSpPr>
+          <p:cNvPr id="16" name="TextBox 15">
+            <a:extLst>
+              <a:ext uri="{FF2B5EF4-FFF2-40B4-BE49-F238E27FC236}">
+                <a16:creationId xmlns:a16="http://schemas.microsoft.com/office/drawing/2014/main" id="{23E01FAD-FDBA-42CE-865D-1617E75B2A19}"/>
+              </a:ext>
+            </a:extLst>
+          </p:cNvPr>
+          <p:cNvSpPr txBox="1"/>
+          <p:nvPr/>
+        </p:nvSpPr>
+        <p:spPr>
+          <a:xfrm>
+            <a:off x="2628712" y="1501704"/>
+            <a:ext cx="1789683" cy="323165"/>
+          </a:xfrm>
+          <a:prstGeom prst="rect">
+            <a:avLst/>
+          </a:prstGeom>
+          <a:noFill/>
+        </p:spPr>
+        <p:txBody>
+          <a:bodyPr wrap="square" rtlCol="0">
+            <a:spAutoFit/>
+          </a:bodyPr>
+          <a:lstStyle/>
+          <a:p>
+            <a:r>
+              <a:rPr lang="en-US" altLang="ko-KR" sz="1500" dirty="0"/>
+              <a:t>&lt;snort alert log&gt;</a:t>
+            </a:r>
+            <a:endParaRPr lang="ko-KR" altLang="en-US" sz="1500" dirty="0"/>
+          </a:p>
+        </p:txBody>
+      </p:sp>
+      <p:sp>
+        <p:nvSpPr>
+          <p:cNvPr id="18" name="TextBox 17">
+            <a:extLst>
+              <a:ext uri="{FF2B5EF4-FFF2-40B4-BE49-F238E27FC236}">
+                <a16:creationId xmlns:a16="http://schemas.microsoft.com/office/drawing/2014/main" id="{3DE489FC-6167-4272-8560-A3DA78296501}"/>
+              </a:ext>
+            </a:extLst>
+          </p:cNvPr>
+          <p:cNvSpPr txBox="1"/>
+          <p:nvPr/>
+        </p:nvSpPr>
+        <p:spPr>
+          <a:xfrm>
+            <a:off x="2550966" y="4315254"/>
+            <a:ext cx="1621420" cy="323165"/>
+          </a:xfrm>
+          <a:prstGeom prst="rect">
+            <a:avLst/>
+          </a:prstGeom>
+          <a:noFill/>
+        </p:spPr>
+        <p:txBody>
+          <a:bodyPr wrap="square" rtlCol="0">
+            <a:spAutoFit/>
+          </a:bodyPr>
+          <a:lstStyle/>
+          <a:p>
+            <a:r>
+              <a:rPr lang="en-US" altLang="ko-KR" sz="1500" dirty="0"/>
+              <a:t>&lt;time.txt </a:t>
+            </a:r>
+            <a:r>
+              <a:rPr lang="ko-KR" altLang="en-US" sz="1500" dirty="0"/>
+              <a:t>파일</a:t>
+            </a:r>
+            <a:r>
+              <a:rPr lang="en-US" altLang="ko-KR" sz="1500" dirty="0"/>
+              <a:t>&gt;</a:t>
+            </a:r>
+            <a:endParaRPr lang="ko-KR" altLang="en-US" sz="1500" dirty="0"/>
+          </a:p>
+        </p:txBody>
+      </p:sp>
+      <p:sp>
+        <p:nvSpPr>
+          <p:cNvPr id="26" name="사각형: 둥근 모서리 25">
+            <a:extLst>
+              <a:ext uri="{FF2B5EF4-FFF2-40B4-BE49-F238E27FC236}">
+                <a16:creationId xmlns:a16="http://schemas.microsoft.com/office/drawing/2014/main" id="{867705E9-9850-48B3-B5D2-331B23C47F56}"/>
+              </a:ext>
+            </a:extLst>
+          </p:cNvPr>
+          <p:cNvSpPr/>
+          <p:nvPr/>
+        </p:nvSpPr>
+        <p:spPr>
+          <a:xfrm>
+            <a:off x="6802051" y="2675509"/>
+            <a:ext cx="1800000" cy="1440000"/>
+          </a:xfrm>
+          <a:prstGeom prst="roundRect">
+            <a:avLst/>
+          </a:prstGeom>
+          <a:noFill/>
+          <a:ln w="25400">
+            <a:solidFill>
+              <a:srgbClr val="840202"/>
+            </a:solidFill>
+          </a:ln>
+        </p:spPr>
+        <p:style>
+          <a:lnRef idx="2">
+            <a:schemeClr val="accent1">
+              <a:shade val="50000"/>
+            </a:schemeClr>
+          </a:lnRef>
+          <a:fillRef idx="1">
+            <a:schemeClr val="accent1"/>
+          </a:fillRef>
+          <a:effectRef idx="0">
+            <a:schemeClr val="accent1"/>
+          </a:effectRef>
+          <a:fontRef idx="minor">
+            <a:schemeClr val="lt1"/>
+          </a:fontRef>
+        </p:style>
+        <p:txBody>
+          <a:bodyPr rtlCol="0" anchor="ctr"/>
+          <a:lstStyle/>
+          <a:p>
+            <a:pPr algn="ctr"/>
+            <a:r>
+              <a:rPr lang="en-US" altLang="ko-KR" dirty="0">
+                <a:solidFill>
+                  <a:schemeClr val="tx1"/>
+                </a:solidFill>
+              </a:rPr>
+              <a:t>Alert</a:t>
+            </a:r>
+            <a:r>
+              <a:rPr lang="ko-KR" altLang="en-US" dirty="0">
+                <a:solidFill>
+                  <a:schemeClr val="tx1"/>
+                </a:solidFill>
+              </a:rPr>
+              <a:t>와 </a:t>
+            </a:r>
+            <a:r>
+              <a:rPr lang="en-US" altLang="ko-KR" dirty="0">
+                <a:solidFill>
+                  <a:schemeClr val="tx1"/>
+                </a:solidFill>
+              </a:rPr>
+              <a:t>time.txt </a:t>
+            </a:r>
+            <a:r>
+              <a:rPr lang="ko-KR" altLang="en-US" dirty="0">
+                <a:solidFill>
+                  <a:schemeClr val="tx1"/>
+                </a:solidFill>
+              </a:rPr>
+              <a:t>시간 부분이 같은가</a:t>
+            </a:r>
+            <a:r>
+              <a:rPr lang="en-US" altLang="ko-KR" dirty="0">
+                <a:solidFill>
+                  <a:schemeClr val="tx1"/>
+                </a:solidFill>
+              </a:rPr>
+              <a:t>?</a:t>
+            </a:r>
+            <a:endParaRPr lang="ko-KR" altLang="en-US" dirty="0">
+              <a:solidFill>
+                <a:schemeClr val="tx1"/>
+              </a:solidFill>
+            </a:endParaRPr>
+          </a:p>
+        </p:txBody>
+      </p:sp>
+      <p:sp>
+        <p:nvSpPr>
+          <p:cNvPr id="27" name="사각형: 둥근 모서리 26">
+            <a:extLst>
+              <a:ext uri="{FF2B5EF4-FFF2-40B4-BE49-F238E27FC236}">
+                <a16:creationId xmlns:a16="http://schemas.microsoft.com/office/drawing/2014/main" id="{5C5A2075-4CB7-4C0D-9806-3B25D2ECD67F}"/>
+              </a:ext>
+            </a:extLst>
+          </p:cNvPr>
+          <p:cNvSpPr/>
+          <p:nvPr/>
+        </p:nvSpPr>
+        <p:spPr>
+          <a:xfrm>
+            <a:off x="9829840" y="2675509"/>
+            <a:ext cx="1800000" cy="1440000"/>
+          </a:xfrm>
+          <a:prstGeom prst="roundRect">
+            <a:avLst/>
+          </a:prstGeom>
+          <a:noFill/>
+          <a:ln w="25400">
+            <a:solidFill>
+              <a:srgbClr val="840202"/>
+            </a:solidFill>
+          </a:ln>
+        </p:spPr>
+        <p:style>
+          <a:lnRef idx="2">
+            <a:schemeClr val="accent1">
+              <a:shade val="50000"/>
+            </a:schemeClr>
+          </a:lnRef>
+          <a:fillRef idx="1">
+            <a:schemeClr val="accent1"/>
+          </a:fillRef>
+          <a:effectRef idx="0">
+            <a:schemeClr val="accent1"/>
+          </a:effectRef>
+          <a:fontRef idx="minor">
+            <a:schemeClr val="lt1"/>
+          </a:fontRef>
+        </p:style>
+        <p:txBody>
+          <a:bodyPr rtlCol="0" anchor="ctr"/>
+          <a:lstStyle/>
+          <a:p>
+            <a:pPr algn="ctr"/>
+            <a:r>
+              <a:rPr lang="ko-KR" altLang="en-US" dirty="0">
+                <a:solidFill>
+                  <a:schemeClr val="tx1"/>
+                </a:solidFill>
+              </a:rPr>
+              <a:t>프로그램 종료</a:t>
+            </a:r>
+          </a:p>
+        </p:txBody>
+      </p:sp>
+      <p:sp>
+        <p:nvSpPr>
+          <p:cNvPr id="28" name="사각형: 둥근 모서리 27">
+            <a:extLst>
+              <a:ext uri="{FF2B5EF4-FFF2-40B4-BE49-F238E27FC236}">
+                <a16:creationId xmlns:a16="http://schemas.microsoft.com/office/drawing/2014/main" id="{6B1A0FBB-4E9B-48DD-97CE-C9D794E1BD83}"/>
+              </a:ext>
+            </a:extLst>
+          </p:cNvPr>
+          <p:cNvSpPr/>
+          <p:nvPr/>
+        </p:nvSpPr>
+        <p:spPr>
+          <a:xfrm>
+            <a:off x="8206693" y="5192967"/>
+            <a:ext cx="1800000" cy="1440000"/>
+          </a:xfrm>
+          <a:prstGeom prst="roundRect">
+            <a:avLst/>
+          </a:prstGeom>
+          <a:noFill/>
+          <a:ln w="25400">
+            <a:solidFill>
+              <a:srgbClr val="840202"/>
+            </a:solidFill>
+          </a:ln>
+        </p:spPr>
+        <p:style>
+          <a:lnRef idx="2">
+            <a:schemeClr val="accent1">
+              <a:shade val="50000"/>
+            </a:schemeClr>
+          </a:lnRef>
+          <a:fillRef idx="1">
+            <a:schemeClr val="accent1"/>
+          </a:fillRef>
+          <a:effectRef idx="0">
+            <a:schemeClr val="accent1"/>
+          </a:effectRef>
+          <a:fontRef idx="minor">
+            <a:schemeClr val="lt1"/>
+          </a:fontRef>
+        </p:style>
+        <p:txBody>
+          <a:bodyPr rtlCol="0" anchor="ctr"/>
+          <a:lstStyle/>
+          <a:p>
+            <a:pPr marL="285750" indent="-285750">
+              <a:buFont typeface="Arial" panose="020B0604020202020204" pitchFamily="34" charset="0"/>
+              <a:buChar char="•"/>
+            </a:pPr>
+            <a:r>
+              <a:rPr lang="en-US" altLang="ko-KR" dirty="0">
+                <a:solidFill>
+                  <a:schemeClr val="tx1"/>
+                </a:solidFill>
+              </a:rPr>
+              <a:t>SMS </a:t>
+            </a:r>
+            <a:r>
+              <a:rPr lang="ko-KR" altLang="en-US" dirty="0">
+                <a:solidFill>
+                  <a:schemeClr val="tx1"/>
+                </a:solidFill>
+              </a:rPr>
+              <a:t>발송</a:t>
+            </a:r>
+            <a:endParaRPr lang="en-US" altLang="ko-KR" dirty="0">
+              <a:solidFill>
+                <a:schemeClr val="tx1"/>
+              </a:solidFill>
+            </a:endParaRPr>
+          </a:p>
+          <a:p>
+            <a:pPr marL="285750" indent="-285750">
+              <a:buFont typeface="Arial" panose="020B0604020202020204" pitchFamily="34" charset="0"/>
+              <a:buChar char="•"/>
+            </a:pPr>
+            <a:r>
+              <a:rPr lang="en-US" altLang="ko-KR" dirty="0">
+                <a:solidFill>
+                  <a:schemeClr val="tx1"/>
+                </a:solidFill>
+              </a:rPr>
+              <a:t>time.txt </a:t>
+            </a:r>
+            <a:r>
+              <a:rPr lang="ko-KR" altLang="en-US" dirty="0">
+                <a:solidFill>
+                  <a:schemeClr val="tx1"/>
+                </a:solidFill>
+              </a:rPr>
+              <a:t>업데이트</a:t>
+            </a:r>
+            <a:endParaRPr lang="en-US" altLang="ko-KR" dirty="0">
+              <a:solidFill>
+                <a:schemeClr val="tx1"/>
+              </a:solidFill>
+            </a:endParaRPr>
+          </a:p>
+        </p:txBody>
+      </p:sp>
+      <p:sp>
+        <p:nvSpPr>
+          <p:cNvPr id="29" name="화살표: 오른쪽 28">
+            <a:extLst>
+              <a:ext uri="{FF2B5EF4-FFF2-40B4-BE49-F238E27FC236}">
+                <a16:creationId xmlns:a16="http://schemas.microsoft.com/office/drawing/2014/main" id="{55E57A9A-3E05-4AF7-840F-A69F6F4BAF8F}"/>
+              </a:ext>
+            </a:extLst>
+          </p:cNvPr>
+          <p:cNvSpPr/>
+          <p:nvPr/>
+        </p:nvSpPr>
+        <p:spPr>
+          <a:xfrm rot="3487308">
+            <a:off x="7982256" y="4500682"/>
+            <a:ext cx="706843" cy="325687"/>
+          </a:xfrm>
+          <a:prstGeom prst="rightArrow">
+            <a:avLst>
+              <a:gd name="adj1" fmla="val 39068"/>
+              <a:gd name="adj2" fmla="val 62802"/>
+            </a:avLst>
+          </a:prstGeom>
+          <a:solidFill>
+            <a:srgbClr val="840202"/>
+          </a:solidFill>
+          <a:ln>
+            <a:solidFill>
+              <a:schemeClr val="bg2">
+                <a:lumMod val="50000"/>
+              </a:schemeClr>
+            </a:solidFill>
+          </a:ln>
+        </p:spPr>
+        <p:style>
+          <a:lnRef idx="2">
+            <a:schemeClr val="accent1">
+              <a:shade val="50000"/>
+            </a:schemeClr>
+          </a:lnRef>
+          <a:fillRef idx="1">
+            <a:schemeClr val="accent1"/>
+          </a:fillRef>
+          <a:effectRef idx="0">
+            <a:schemeClr val="accent1"/>
+          </a:effectRef>
+          <a:fontRef idx="minor">
+            <a:schemeClr val="lt1"/>
+          </a:fontRef>
+        </p:style>
+        <p:txBody>
+          <a:bodyPr rtlCol="0" anchor="ctr"/>
+          <a:lstStyle/>
+          <a:p>
+            <a:pPr algn="ctr"/>
+            <a:endParaRPr lang="ko-KR" altLang="en-US"/>
+          </a:p>
+        </p:txBody>
+      </p:sp>
+      <p:sp>
+        <p:nvSpPr>
+          <p:cNvPr id="30" name="화살표: 오른쪽 29">
+            <a:extLst>
+              <a:ext uri="{FF2B5EF4-FFF2-40B4-BE49-F238E27FC236}">
+                <a16:creationId xmlns:a16="http://schemas.microsoft.com/office/drawing/2014/main" id="{7A0D9E6E-864E-4BBD-A48A-A97F0E0B8686}"/>
+              </a:ext>
+            </a:extLst>
+          </p:cNvPr>
+          <p:cNvSpPr/>
+          <p:nvPr/>
+        </p:nvSpPr>
+        <p:spPr>
+          <a:xfrm>
+            <a:off x="8875018" y="3296168"/>
+            <a:ext cx="706843" cy="325687"/>
+          </a:xfrm>
+          <a:prstGeom prst="rightArrow">
+            <a:avLst>
+              <a:gd name="adj1" fmla="val 39068"/>
+              <a:gd name="adj2" fmla="val 62802"/>
+            </a:avLst>
+          </a:prstGeom>
+          <a:solidFill>
+            <a:srgbClr val="840202"/>
+          </a:solidFill>
+          <a:ln>
+            <a:solidFill>
+              <a:schemeClr val="bg2">
+                <a:lumMod val="50000"/>
+              </a:schemeClr>
+            </a:solidFill>
+          </a:ln>
+        </p:spPr>
+        <p:style>
+          <a:lnRef idx="2">
+            <a:schemeClr val="accent1">
+              <a:shade val="50000"/>
+            </a:schemeClr>
+          </a:lnRef>
+          <a:fillRef idx="1">
+            <a:schemeClr val="accent1"/>
+          </a:fillRef>
+          <a:effectRef idx="0">
+            <a:schemeClr val="accent1"/>
+          </a:effectRef>
+          <a:fontRef idx="minor">
+            <a:schemeClr val="lt1"/>
+          </a:fontRef>
+        </p:style>
+        <p:txBody>
+          <a:bodyPr rtlCol="0" anchor="ctr"/>
+          <a:lstStyle/>
+          <a:p>
+            <a:pPr algn="ctr"/>
+            <a:endParaRPr lang="ko-KR" altLang="en-US"/>
+          </a:p>
+        </p:txBody>
+      </p:sp>
+      <p:sp>
+        <p:nvSpPr>
+          <p:cNvPr id="31" name="TextBox 30">
+            <a:extLst>
+              <a:ext uri="{FF2B5EF4-FFF2-40B4-BE49-F238E27FC236}">
+                <a16:creationId xmlns:a16="http://schemas.microsoft.com/office/drawing/2014/main" id="{62397BD8-4269-4110-A05F-43F00770A540}"/>
+              </a:ext>
+            </a:extLst>
+          </p:cNvPr>
+          <p:cNvSpPr txBox="1"/>
+          <p:nvPr/>
+        </p:nvSpPr>
+        <p:spPr>
+          <a:xfrm>
+            <a:off x="8854698" y="2960100"/>
+            <a:ext cx="706843" cy="369332"/>
+          </a:xfrm>
+          <a:prstGeom prst="rect">
+            <a:avLst/>
+          </a:prstGeom>
+          <a:noFill/>
+        </p:spPr>
+        <p:txBody>
+          <a:bodyPr wrap="square" rtlCol="0">
+            <a:spAutoFit/>
+          </a:bodyPr>
+          <a:lstStyle/>
+          <a:p>
+            <a:pPr algn="ctr"/>
+            <a:r>
+              <a:rPr lang="en-US" altLang="ko-KR" dirty="0"/>
+              <a:t>yes</a:t>
+            </a:r>
+            <a:endParaRPr lang="ko-KR" altLang="en-US" dirty="0"/>
+          </a:p>
+        </p:txBody>
+      </p:sp>
+      <p:sp>
+        <p:nvSpPr>
+          <p:cNvPr id="32" name="TextBox 31">
+            <a:extLst>
+              <a:ext uri="{FF2B5EF4-FFF2-40B4-BE49-F238E27FC236}">
+                <a16:creationId xmlns:a16="http://schemas.microsoft.com/office/drawing/2014/main" id="{35D9CFE6-E97A-4CBF-B64A-8A9AF52FC5F9}"/>
+              </a:ext>
+            </a:extLst>
+          </p:cNvPr>
+          <p:cNvSpPr txBox="1"/>
+          <p:nvPr/>
+        </p:nvSpPr>
+        <p:spPr>
+          <a:xfrm>
+            <a:off x="8195651" y="4294193"/>
+            <a:ext cx="706843" cy="369332"/>
+          </a:xfrm>
+          <a:prstGeom prst="rect">
+            <a:avLst/>
+          </a:prstGeom>
+          <a:noFill/>
+        </p:spPr>
+        <p:txBody>
+          <a:bodyPr wrap="square" rtlCol="0">
+            <a:spAutoFit/>
+          </a:bodyPr>
+          <a:lstStyle/>
+          <a:p>
+            <a:pPr algn="ctr"/>
+            <a:r>
+              <a:rPr lang="en-US" altLang="ko-KR" dirty="0"/>
+              <a:t>no</a:t>
+            </a:r>
+            <a:endParaRPr lang="ko-KR" altLang="en-US" dirty="0"/>
+          </a:p>
+        </p:txBody>
+      </p:sp>
+      <p:sp>
+        <p:nvSpPr>
+          <p:cNvPr id="33" name="화살표: 오른쪽 32">
+            <a:extLst>
+              <a:ext uri="{FF2B5EF4-FFF2-40B4-BE49-F238E27FC236}">
+                <a16:creationId xmlns:a16="http://schemas.microsoft.com/office/drawing/2014/main" id="{D061E81A-FA64-4F25-A4BC-E07D5C4F8D72}"/>
+              </a:ext>
+            </a:extLst>
+          </p:cNvPr>
+          <p:cNvSpPr/>
+          <p:nvPr/>
+        </p:nvSpPr>
+        <p:spPr>
+          <a:xfrm rot="18296959">
+            <a:off x="9513399" y="4500682"/>
+            <a:ext cx="706843" cy="325687"/>
+          </a:xfrm>
+          <a:prstGeom prst="rightArrow">
+            <a:avLst>
+              <a:gd name="adj1" fmla="val 39068"/>
+              <a:gd name="adj2" fmla="val 62802"/>
+            </a:avLst>
+          </a:prstGeom>
+          <a:solidFill>
+            <a:srgbClr val="840202"/>
+          </a:solidFill>
+          <a:ln>
+            <a:solidFill>
+              <a:schemeClr val="bg2">
+                <a:lumMod val="50000"/>
+              </a:schemeClr>
+            </a:solidFill>
+          </a:ln>
+        </p:spPr>
+        <p:style>
+          <a:lnRef idx="2">
+            <a:schemeClr val="accent1">
+              <a:shade val="50000"/>
+            </a:schemeClr>
+          </a:lnRef>
+          <a:fillRef idx="1">
+            <a:schemeClr val="accent1"/>
+          </a:fillRef>
+          <a:effectRef idx="0">
+            <a:schemeClr val="accent1"/>
+          </a:effectRef>
+          <a:fontRef idx="minor">
+            <a:schemeClr val="lt1"/>
+          </a:fontRef>
+        </p:style>
+        <p:txBody>
+          <a:bodyPr rtlCol="0" anchor="ctr"/>
+          <a:lstStyle/>
+          <a:p>
+            <a:pPr algn="ctr"/>
+            <a:endParaRPr lang="ko-KR" altLang="en-US"/>
+          </a:p>
+        </p:txBody>
+      </p:sp>
+    </p:spTree>
+    <p:extLst>
+      <p:ext uri="{BB962C8B-B14F-4D97-AF65-F5344CB8AC3E}">
+        <p14:creationId xmlns:p14="http://schemas.microsoft.com/office/powerpoint/2010/main" val="2295148091"/>
+      </p:ext>
+    </p:extLst>
+  </p:cSld>
+  <p:clrMapOvr>
+    <a:masterClrMapping/>
+  </p:clrMapOvr>
+</p:sld>
+</file>
+
+<file path=ppt/slides/slide14.xml><?xml version="1.0" encoding="utf-8"?>
+<p:sld xmlns:a="http://schemas.openxmlformats.org/drawingml/2006/main" xmlns:r="http://schemas.openxmlformats.org/officeDocument/2006/relationships" xmlns:p="http://schemas.openxmlformats.org/presentationml/2006/main">
+  <p:cSld>
+    <p:spTree>
+      <p:nvGrpSpPr>
+        <p:cNvPr id="1" name=""/>
+        <p:cNvGrpSpPr/>
+        <p:nvPr/>
+      </p:nvGrpSpPr>
+      <p:grpSpPr>
+        <a:xfrm>
+          <a:off x="0" y="0"/>
+          <a:ext cx="0" cy="0"/>
+          <a:chOff x="0" y="0"/>
+          <a:chExt cx="0" cy="0"/>
+        </a:xfrm>
+      </p:grpSpPr>
+      <p:sp>
+        <p:nvSpPr>
+          <p:cNvPr id="2" name="제목 1">
+            <a:extLst>
+              <a:ext uri="{FF2B5EF4-FFF2-40B4-BE49-F238E27FC236}">
+                <a16:creationId xmlns:a16="http://schemas.microsoft.com/office/drawing/2014/main" id="{3687D5C3-FD77-409D-9E6F-3374E84F699D}"/>
+              </a:ext>
+            </a:extLst>
+          </p:cNvPr>
+          <p:cNvSpPr>
+            <a:spLocks noGrp="1"/>
+          </p:cNvSpPr>
+          <p:nvPr>
+            <p:ph type="title"/>
+          </p:nvPr>
+        </p:nvSpPr>
+        <p:spPr>
+          <a:xfrm>
+            <a:off x="720000" y="-36000"/>
+            <a:ext cx="10515600" cy="1325563"/>
+          </a:xfrm>
+        </p:spPr>
+        <p:txBody>
+          <a:bodyPr/>
+          <a:lstStyle/>
+          <a:p>
+            <a:r>
+              <a:rPr lang="ko-KR" altLang="en-US" dirty="0"/>
+              <a:t>세부 내용 </a:t>
+            </a:r>
+            <a:r>
+              <a:rPr lang="en-US" altLang="ko-KR" dirty="0"/>
+              <a:t>– 1</a:t>
+            </a:r>
+            <a:r>
+              <a:rPr lang="ko-KR" altLang="en-US" dirty="0"/>
+              <a:t>차 테스트</a:t>
+            </a:r>
+          </a:p>
+        </p:txBody>
+      </p:sp>
+      <p:sp>
+        <p:nvSpPr>
           <p:cNvPr id="10" name="내용 개체 틀 2">
             <a:extLst>
               <a:ext uri="{FF2B5EF4-FFF2-40B4-BE49-F238E27FC236}">
@@ -5065,7 +6693,7 @@
         </p:nvSpPr>
         <p:spPr>
           <a:xfrm>
-            <a:off x="6463034" y="1718826"/>
+            <a:off x="6463035" y="1372472"/>
             <a:ext cx="5166805" cy="1232466"/>
           </a:xfrm>
           <a:prstGeom prst="rect">
@@ -5243,30 +6871,111 @@
           <a:p>
             <a:r>
               <a:rPr lang="en-US" altLang="ko-KR" dirty="0"/>
-              <a:t>Snort/alert </a:t>
+              <a:t>alert </a:t>
             </a:r>
             <a:r>
               <a:rPr lang="ko-KR" altLang="en-US" dirty="0"/>
-              <a:t>로그의 시간</a:t>
+              <a:t>로그와 </a:t>
             </a:r>
             <a:r>
               <a:rPr lang="en-US" altLang="ko-KR" dirty="0"/>
-              <a:t> </a:t>
+              <a:t>time.txt </a:t>
             </a:r>
             <a:r>
               <a:rPr lang="ko-KR" altLang="en-US" dirty="0"/>
-              <a:t>부분 복사</a:t>
-            </a:r>
-            <a:endParaRPr lang="en-US" altLang="ko-KR" dirty="0"/>
-          </a:p>
-        </p:txBody>
-      </p:sp>
-      <p:sp>
-        <p:nvSpPr>
-          <p:cNvPr id="11" name="직사각형 10">
-            <a:extLst>
-              <a:ext uri="{FF2B5EF4-FFF2-40B4-BE49-F238E27FC236}">
-                <a16:creationId xmlns:a16="http://schemas.microsoft.com/office/drawing/2014/main" id="{043B95E2-228C-4FC9-92D3-A0E9C2049956}"/>
+              <a:t>의 시간을 다르게 설정 </a:t>
+            </a:r>
+            <a:r>
+              <a:rPr lang="en-US" altLang="ko-KR" dirty="0"/>
+              <a:t>(no </a:t>
+            </a:r>
+            <a:r>
+              <a:rPr lang="ko-KR" altLang="en-US" dirty="0"/>
+              <a:t>조건 만족</a:t>
+            </a:r>
+            <a:r>
+              <a:rPr lang="en-US" altLang="ko-KR" dirty="0"/>
+              <a:t>)</a:t>
+            </a:r>
+          </a:p>
+        </p:txBody>
+      </p:sp>
+      <p:pic>
+        <p:nvPicPr>
+          <p:cNvPr id="13" name="그림 12">
+            <a:extLst>
+              <a:ext uri="{FF2B5EF4-FFF2-40B4-BE49-F238E27FC236}">
+                <a16:creationId xmlns:a16="http://schemas.microsoft.com/office/drawing/2014/main" id="{D845CD34-0719-45B3-9CB8-847B2B454A8D}"/>
+              </a:ext>
+            </a:extLst>
+          </p:cNvPr>
+          <p:cNvPicPr>
+            <a:picLocks noChangeAspect="1"/>
+          </p:cNvPicPr>
+          <p:nvPr/>
+        </p:nvPicPr>
+        <p:blipFill>
+          <a:blip r:embed="rId2"/>
+          <a:stretch>
+            <a:fillRect/>
+          </a:stretch>
+        </p:blipFill>
+        <p:spPr>
+          <a:xfrm>
+            <a:off x="614042" y="1960082"/>
+            <a:ext cx="5114925" cy="2085975"/>
+          </a:xfrm>
+          <a:prstGeom prst="rect">
+            <a:avLst/>
+          </a:prstGeom>
+          <a:ln>
+            <a:solidFill>
+              <a:schemeClr val="tx1"/>
+            </a:solidFill>
+          </a:ln>
+        </p:spPr>
+      </p:pic>
+      <p:pic>
+        <p:nvPicPr>
+          <p:cNvPr id="14" name="그림 13">
+            <a:extLst>
+              <a:ext uri="{FF2B5EF4-FFF2-40B4-BE49-F238E27FC236}">
+                <a16:creationId xmlns:a16="http://schemas.microsoft.com/office/drawing/2014/main" id="{7B2BD559-0C76-4E31-A168-532D298A4AA8}"/>
+              </a:ext>
+            </a:extLst>
+          </p:cNvPr>
+          <p:cNvPicPr>
+            <a:picLocks noChangeAspect="1"/>
+          </p:cNvPicPr>
+          <p:nvPr/>
+        </p:nvPicPr>
+        <p:blipFill>
+          <a:blip r:embed="rId3"/>
+          <a:stretch>
+            <a:fillRect/>
+          </a:stretch>
+        </p:blipFill>
+        <p:spPr>
+          <a:xfrm>
+            <a:off x="604517" y="5328528"/>
+            <a:ext cx="5124450" cy="371475"/>
+          </a:xfrm>
+          <a:prstGeom prst="rect">
+            <a:avLst/>
+          </a:prstGeom>
+          <a:ln>
+            <a:solidFill>
+              <a:schemeClr val="tx1"/>
+            </a:solidFill>
+          </a:ln>
+        </p:spPr>
+      </p:pic>
+      <p:sp>
+        <p:nvSpPr>
+          <p:cNvPr id="16" name="직사각형 15">
+            <a:extLst>
+              <a:ext uri="{FF2B5EF4-FFF2-40B4-BE49-F238E27FC236}">
+                <a16:creationId xmlns:a16="http://schemas.microsoft.com/office/drawing/2014/main" id="{5F6B1B6D-EC6B-46EC-A691-19A2D3EF8539}"/>
               </a:ext>
             </a:extLst>
           </p:cNvPr>
@@ -5275,8 +6984,8 @@
         </p:nvSpPr>
         <p:spPr>
           <a:xfrm>
-            <a:off x="835743" y="2038224"/>
-            <a:ext cx="2369574" cy="311686"/>
+            <a:off x="604516" y="2075150"/>
+            <a:ext cx="2433651" cy="250724"/>
           </a:xfrm>
           <a:prstGeom prst="rect">
             <a:avLst/>
@@ -5315,10 +7024,10 @@
       </p:sp>
       <p:sp>
         <p:nvSpPr>
-          <p:cNvPr id="12" name="직사각형 11">
-            <a:extLst>
-              <a:ext uri="{FF2B5EF4-FFF2-40B4-BE49-F238E27FC236}">
-                <a16:creationId xmlns:a16="http://schemas.microsoft.com/office/drawing/2014/main" id="{D5436CA7-9FA2-48D4-B150-112CA1025C6B}"/>
+          <p:cNvPr id="17" name="직사각형 16">
+            <a:extLst>
+              <a:ext uri="{FF2B5EF4-FFF2-40B4-BE49-F238E27FC236}">
+                <a16:creationId xmlns:a16="http://schemas.microsoft.com/office/drawing/2014/main" id="{B28534BD-49D0-4E08-AE83-7BF676DBBEC3}"/>
               </a:ext>
             </a:extLst>
           </p:cNvPr>
@@ -5327,8 +7036,8 @@
         </p:nvSpPr>
         <p:spPr>
           <a:xfrm>
-            <a:off x="2121952" y="5204708"/>
-            <a:ext cx="2459880" cy="370182"/>
+            <a:off x="604517" y="5427408"/>
+            <a:ext cx="2354993" cy="250724"/>
           </a:xfrm>
           <a:prstGeom prst="rect">
             <a:avLst/>
@@ -5367,10 +7076,10 @@
       </p:sp>
       <p:cxnSp>
         <p:nvCxnSpPr>
-          <p:cNvPr id="13" name="직선 연결선 12">
-            <a:extLst>
-              <a:ext uri="{FF2B5EF4-FFF2-40B4-BE49-F238E27FC236}">
-                <a16:creationId xmlns:a16="http://schemas.microsoft.com/office/drawing/2014/main" id="{FD4CBF78-11AD-40F9-9498-8D772922C641}"/>
+          <p:cNvPr id="8" name="직선 연결선 7">
+            <a:extLst>
+              <a:ext uri="{FF2B5EF4-FFF2-40B4-BE49-F238E27FC236}">
+                <a16:creationId xmlns:a16="http://schemas.microsoft.com/office/drawing/2014/main" id="{BAEBEDF8-6095-41A7-A717-AF3C29E99583}"/>
               </a:ext>
             </a:extLst>
           </p:cNvPr>
@@ -5412,10 +7121,10 @@
       </p:cxnSp>
       <p:sp>
         <p:nvSpPr>
-          <p:cNvPr id="14" name="이등변 삼각형 13">
-            <a:extLst>
-              <a:ext uri="{FF2B5EF4-FFF2-40B4-BE49-F238E27FC236}">
-                <a16:creationId xmlns:a16="http://schemas.microsoft.com/office/drawing/2014/main" id="{FB3DB263-37A2-4ED7-A695-D9D9326ED582}"/>
+          <p:cNvPr id="9" name="이등변 삼각형 8">
+            <a:extLst>
+              <a:ext uri="{FF2B5EF4-FFF2-40B4-BE49-F238E27FC236}">
+                <a16:creationId xmlns:a16="http://schemas.microsoft.com/office/drawing/2014/main" id="{683FD27D-EB67-40D2-BD6B-4F95AB11E42D}"/>
               </a:ext>
             </a:extLst>
           </p:cNvPr>
@@ -5466,10 +7175,10 @@
       </p:sp>
       <p:sp>
         <p:nvSpPr>
-          <p:cNvPr id="15" name="이등변 삼각형 14">
-            <a:extLst>
-              <a:ext uri="{FF2B5EF4-FFF2-40B4-BE49-F238E27FC236}">
-                <a16:creationId xmlns:a16="http://schemas.microsoft.com/office/drawing/2014/main" id="{EB7B70B9-AC78-4A9D-9DB8-D660CB57EC11}"/>
+          <p:cNvPr id="11" name="이등변 삼각형 10">
+            <a:extLst>
+              <a:ext uri="{FF2B5EF4-FFF2-40B4-BE49-F238E27FC236}">
+                <a16:creationId xmlns:a16="http://schemas.microsoft.com/office/drawing/2014/main" id="{EA660BB8-6A3E-4747-B9FE-676292B2FE5D}"/>
               </a:ext>
             </a:extLst>
           </p:cNvPr>
@@ -5520,10 +7229,10 @@
       </p:sp>
       <p:sp>
         <p:nvSpPr>
-          <p:cNvPr id="16" name="TextBox 15">
-            <a:extLst>
-              <a:ext uri="{FF2B5EF4-FFF2-40B4-BE49-F238E27FC236}">
-                <a16:creationId xmlns:a16="http://schemas.microsoft.com/office/drawing/2014/main" id="{23E01FAD-FDBA-42CE-865D-1617E75B2A19}"/>
+          <p:cNvPr id="12" name="TextBox 11">
+            <a:extLst>
+              <a:ext uri="{FF2B5EF4-FFF2-40B4-BE49-F238E27FC236}">
+                <a16:creationId xmlns:a16="http://schemas.microsoft.com/office/drawing/2014/main" id="{2700A795-DA94-4341-ABCA-482824ADCE39}"/>
               </a:ext>
             </a:extLst>
           </p:cNvPr>
@@ -5532,7 +7241,7 @@
         </p:nvSpPr>
         <p:spPr>
           <a:xfrm>
-            <a:off x="2821752" y="1501632"/>
+            <a:off x="2271899" y="1509440"/>
             <a:ext cx="1789683" cy="323165"/>
           </a:xfrm>
           <a:prstGeom prst="rect">
@@ -5548,7 +7257,15 @@
           <a:p>
             <a:r>
               <a:rPr lang="en-US" altLang="ko-KR" sz="1500" dirty="0"/>
-              <a:t>&lt;snort log&gt;</a:t>
+              <a:t>&lt;snort</a:t>
+            </a:r>
+            <a:r>
+              <a:rPr lang="ko-KR" altLang="en-US" sz="1500" dirty="0"/>
+              <a:t> </a:t>
+            </a:r>
+            <a:r>
+              <a:rPr lang="en-US" altLang="ko-KR" sz="1500" dirty="0"/>
+              <a:t>alert log&gt;</a:t>
             </a:r>
             <a:endParaRPr lang="ko-KR" altLang="en-US" sz="1500" dirty="0"/>
           </a:p>
@@ -5556,10 +7273,10 @@
       </p:sp>
       <p:sp>
         <p:nvSpPr>
-          <p:cNvPr id="18" name="TextBox 17">
-            <a:extLst>
-              <a:ext uri="{FF2B5EF4-FFF2-40B4-BE49-F238E27FC236}">
-                <a16:creationId xmlns:a16="http://schemas.microsoft.com/office/drawing/2014/main" id="{3DE489FC-6167-4272-8560-A3DA78296501}"/>
+          <p:cNvPr id="15" name="TextBox 14">
+            <a:extLst>
+              <a:ext uri="{FF2B5EF4-FFF2-40B4-BE49-F238E27FC236}">
+                <a16:creationId xmlns:a16="http://schemas.microsoft.com/office/drawing/2014/main" id="{9EA92BD1-2AF4-41A9-8861-AC2BD5E34F1E}"/>
               </a:ext>
             </a:extLst>
           </p:cNvPr>
@@ -5568,8 +7285,8 @@
         </p:nvSpPr>
         <p:spPr>
           <a:xfrm>
-            <a:off x="2550966" y="4315254"/>
-            <a:ext cx="1621420" cy="323165"/>
+            <a:off x="1989245" y="4869802"/>
+            <a:ext cx="2354993" cy="323165"/>
           </a:xfrm>
           <a:prstGeom prst="rect">
             <a:avLst/>
@@ -5588,20 +7305,580 @@
             </a:r>
             <a:r>
               <a:rPr lang="ko-KR" altLang="en-US" sz="1500" dirty="0"/>
-              <a:t>파일</a:t>
+              <a:t>파일 내 시간</a:t>
             </a:r>
             <a:r>
               <a:rPr lang="en-US" altLang="ko-KR" sz="1500" dirty="0"/>
               <a:t>&gt;</a:t>
             </a:r>
             <a:endParaRPr lang="ko-KR" altLang="en-US" sz="1500" dirty="0"/>
+          </a:p>
+        </p:txBody>
+      </p:sp>
+      <p:sp>
+        <p:nvSpPr>
+          <p:cNvPr id="18" name="사각형: 둥근 모서리 17">
+            <a:extLst>
+              <a:ext uri="{FF2B5EF4-FFF2-40B4-BE49-F238E27FC236}">
+                <a16:creationId xmlns:a16="http://schemas.microsoft.com/office/drawing/2014/main" id="{87DAEF74-2870-4B91-8CD3-58D314284C6F}"/>
+              </a:ext>
+            </a:extLst>
+          </p:cNvPr>
+          <p:cNvSpPr/>
+          <p:nvPr/>
+        </p:nvSpPr>
+        <p:spPr>
+          <a:xfrm>
+            <a:off x="6802051" y="2675509"/>
+            <a:ext cx="1800000" cy="1440000"/>
+          </a:xfrm>
+          <a:prstGeom prst="roundRect">
+            <a:avLst/>
+          </a:prstGeom>
+          <a:noFill/>
+          <a:ln w="25400">
+            <a:solidFill>
+              <a:srgbClr val="840202"/>
+            </a:solidFill>
+          </a:ln>
+        </p:spPr>
+        <p:style>
+          <a:lnRef idx="2">
+            <a:schemeClr val="accent1">
+              <a:shade val="50000"/>
+            </a:schemeClr>
+          </a:lnRef>
+          <a:fillRef idx="1">
+            <a:schemeClr val="accent1"/>
+          </a:fillRef>
+          <a:effectRef idx="0">
+            <a:schemeClr val="accent1"/>
+          </a:effectRef>
+          <a:fontRef idx="minor">
+            <a:schemeClr val="lt1"/>
+          </a:fontRef>
+        </p:style>
+        <p:txBody>
+          <a:bodyPr rtlCol="0" anchor="ctr"/>
+          <a:lstStyle/>
+          <a:p>
+            <a:pPr algn="ctr"/>
+            <a:r>
+              <a:rPr lang="en-US" altLang="ko-KR" dirty="0">
+                <a:solidFill>
+                  <a:schemeClr val="tx1"/>
+                </a:solidFill>
+              </a:rPr>
+              <a:t>Alert</a:t>
+            </a:r>
+            <a:r>
+              <a:rPr lang="ko-KR" altLang="en-US" dirty="0">
+                <a:solidFill>
+                  <a:schemeClr val="tx1"/>
+                </a:solidFill>
+              </a:rPr>
+              <a:t>와 </a:t>
+            </a:r>
+            <a:r>
+              <a:rPr lang="en-US" altLang="ko-KR" dirty="0">
+                <a:solidFill>
+                  <a:schemeClr val="tx1"/>
+                </a:solidFill>
+              </a:rPr>
+              <a:t>time.txt </a:t>
+            </a:r>
+            <a:r>
+              <a:rPr lang="ko-KR" altLang="en-US" dirty="0">
+                <a:solidFill>
+                  <a:schemeClr val="tx1"/>
+                </a:solidFill>
+              </a:rPr>
+              <a:t>시간 부분이 같은가</a:t>
+            </a:r>
+            <a:r>
+              <a:rPr lang="en-US" altLang="ko-KR" dirty="0">
+                <a:solidFill>
+                  <a:schemeClr val="tx1"/>
+                </a:solidFill>
+              </a:rPr>
+              <a:t>?</a:t>
+            </a:r>
+            <a:endParaRPr lang="ko-KR" altLang="en-US" dirty="0">
+              <a:solidFill>
+                <a:schemeClr val="tx1"/>
+              </a:solidFill>
+            </a:endParaRPr>
+          </a:p>
+        </p:txBody>
+      </p:sp>
+      <p:sp>
+        <p:nvSpPr>
+          <p:cNvPr id="19" name="사각형: 둥근 모서리 18">
+            <a:extLst>
+              <a:ext uri="{FF2B5EF4-FFF2-40B4-BE49-F238E27FC236}">
+                <a16:creationId xmlns:a16="http://schemas.microsoft.com/office/drawing/2014/main" id="{07E2471E-0829-481B-8F5E-B569D1546A84}"/>
+              </a:ext>
+            </a:extLst>
+          </p:cNvPr>
+          <p:cNvSpPr/>
+          <p:nvPr/>
+        </p:nvSpPr>
+        <p:spPr>
+          <a:xfrm>
+            <a:off x="9829840" y="2675509"/>
+            <a:ext cx="1800000" cy="1440000"/>
+          </a:xfrm>
+          <a:prstGeom prst="roundRect">
+            <a:avLst/>
+          </a:prstGeom>
+          <a:noFill/>
+          <a:ln w="25400">
+            <a:solidFill>
+              <a:srgbClr val="840202"/>
+            </a:solidFill>
+          </a:ln>
+        </p:spPr>
+        <p:style>
+          <a:lnRef idx="2">
+            <a:schemeClr val="accent1">
+              <a:shade val="50000"/>
+            </a:schemeClr>
+          </a:lnRef>
+          <a:fillRef idx="1">
+            <a:schemeClr val="accent1"/>
+          </a:fillRef>
+          <a:effectRef idx="0">
+            <a:schemeClr val="accent1"/>
+          </a:effectRef>
+          <a:fontRef idx="minor">
+            <a:schemeClr val="lt1"/>
+          </a:fontRef>
+        </p:style>
+        <p:txBody>
+          <a:bodyPr rtlCol="0" anchor="ctr"/>
+          <a:lstStyle/>
+          <a:p>
+            <a:pPr algn="ctr"/>
+            <a:r>
+              <a:rPr lang="ko-KR" altLang="en-US" dirty="0">
+                <a:solidFill>
+                  <a:schemeClr val="tx1"/>
+                </a:solidFill>
+              </a:rPr>
+              <a:t>프로그램 종료</a:t>
+            </a:r>
+          </a:p>
+        </p:txBody>
+      </p:sp>
+      <p:sp>
+        <p:nvSpPr>
+          <p:cNvPr id="20" name="사각형: 둥근 모서리 19">
+            <a:extLst>
+              <a:ext uri="{FF2B5EF4-FFF2-40B4-BE49-F238E27FC236}">
+                <a16:creationId xmlns:a16="http://schemas.microsoft.com/office/drawing/2014/main" id="{29255FB4-1A52-4F58-9ED0-8F9D3D8EF454}"/>
+              </a:ext>
+            </a:extLst>
+          </p:cNvPr>
+          <p:cNvSpPr/>
+          <p:nvPr/>
+        </p:nvSpPr>
+        <p:spPr>
+          <a:xfrm>
+            <a:off x="8206693" y="5192967"/>
+            <a:ext cx="1800000" cy="1440000"/>
+          </a:xfrm>
+          <a:prstGeom prst="roundRect">
+            <a:avLst/>
+          </a:prstGeom>
+          <a:noFill/>
+          <a:ln w="25400">
+            <a:solidFill>
+              <a:srgbClr val="840202"/>
+            </a:solidFill>
+          </a:ln>
+        </p:spPr>
+        <p:style>
+          <a:lnRef idx="2">
+            <a:schemeClr val="accent1">
+              <a:shade val="50000"/>
+            </a:schemeClr>
+          </a:lnRef>
+          <a:fillRef idx="1">
+            <a:schemeClr val="accent1"/>
+          </a:fillRef>
+          <a:effectRef idx="0">
+            <a:schemeClr val="accent1"/>
+          </a:effectRef>
+          <a:fontRef idx="minor">
+            <a:schemeClr val="lt1"/>
+          </a:fontRef>
+        </p:style>
+        <p:txBody>
+          <a:bodyPr rtlCol="0" anchor="ctr"/>
+          <a:lstStyle/>
+          <a:p>
+            <a:pPr marL="285750" indent="-285750">
+              <a:buFont typeface="Arial" panose="020B0604020202020204" pitchFamily="34" charset="0"/>
+              <a:buChar char="•"/>
+            </a:pPr>
+            <a:r>
+              <a:rPr lang="en-US" altLang="ko-KR" dirty="0">
+                <a:solidFill>
+                  <a:schemeClr val="tx1"/>
+                </a:solidFill>
+              </a:rPr>
+              <a:t>SMS </a:t>
+            </a:r>
+            <a:r>
+              <a:rPr lang="ko-KR" altLang="en-US" dirty="0">
+                <a:solidFill>
+                  <a:schemeClr val="tx1"/>
+                </a:solidFill>
+              </a:rPr>
+              <a:t>발송</a:t>
+            </a:r>
+            <a:endParaRPr lang="en-US" altLang="ko-KR" dirty="0">
+              <a:solidFill>
+                <a:schemeClr val="tx1"/>
+              </a:solidFill>
+            </a:endParaRPr>
+          </a:p>
+          <a:p>
+            <a:pPr marL="285750" indent="-285750">
+              <a:buFont typeface="Arial" panose="020B0604020202020204" pitchFamily="34" charset="0"/>
+              <a:buChar char="•"/>
+            </a:pPr>
+            <a:r>
+              <a:rPr lang="en-US" altLang="ko-KR" dirty="0">
+                <a:solidFill>
+                  <a:schemeClr val="tx1"/>
+                </a:solidFill>
+              </a:rPr>
+              <a:t>time.txt </a:t>
+            </a:r>
+            <a:r>
+              <a:rPr lang="ko-KR" altLang="en-US" dirty="0">
+                <a:solidFill>
+                  <a:schemeClr val="tx1"/>
+                </a:solidFill>
+              </a:rPr>
+              <a:t>업데이트</a:t>
+            </a:r>
+            <a:endParaRPr lang="en-US" altLang="ko-KR" dirty="0">
+              <a:solidFill>
+                <a:schemeClr val="tx1"/>
+              </a:solidFill>
+            </a:endParaRPr>
+          </a:p>
+        </p:txBody>
+      </p:sp>
+      <p:sp>
+        <p:nvSpPr>
+          <p:cNvPr id="22" name="화살표: 오른쪽 21">
+            <a:extLst>
+              <a:ext uri="{FF2B5EF4-FFF2-40B4-BE49-F238E27FC236}">
+                <a16:creationId xmlns:a16="http://schemas.microsoft.com/office/drawing/2014/main" id="{5488FCBD-7B50-4763-A29E-4A45808C0A90}"/>
+              </a:ext>
+            </a:extLst>
+          </p:cNvPr>
+          <p:cNvSpPr/>
+          <p:nvPr/>
+        </p:nvSpPr>
+        <p:spPr>
+          <a:xfrm rot="3487308">
+            <a:off x="7982256" y="4500682"/>
+            <a:ext cx="706843" cy="325687"/>
+          </a:xfrm>
+          <a:prstGeom prst="rightArrow">
+            <a:avLst>
+              <a:gd name="adj1" fmla="val 39068"/>
+              <a:gd name="adj2" fmla="val 62802"/>
+            </a:avLst>
+          </a:prstGeom>
+          <a:solidFill>
+            <a:srgbClr val="840202"/>
+          </a:solidFill>
+          <a:ln>
+            <a:solidFill>
+              <a:schemeClr val="bg2">
+                <a:lumMod val="50000"/>
+              </a:schemeClr>
+            </a:solidFill>
+          </a:ln>
+        </p:spPr>
+        <p:style>
+          <a:lnRef idx="2">
+            <a:schemeClr val="accent1">
+              <a:shade val="50000"/>
+            </a:schemeClr>
+          </a:lnRef>
+          <a:fillRef idx="1">
+            <a:schemeClr val="accent1"/>
+          </a:fillRef>
+          <a:effectRef idx="0">
+            <a:schemeClr val="accent1"/>
+          </a:effectRef>
+          <a:fontRef idx="minor">
+            <a:schemeClr val="lt1"/>
+          </a:fontRef>
+        </p:style>
+        <p:txBody>
+          <a:bodyPr rtlCol="0" anchor="ctr"/>
+          <a:lstStyle/>
+          <a:p>
+            <a:pPr algn="ctr"/>
+            <a:endParaRPr lang="ko-KR" altLang="en-US"/>
+          </a:p>
+        </p:txBody>
+      </p:sp>
+      <p:sp>
+        <p:nvSpPr>
+          <p:cNvPr id="25" name="화살표: 오른쪽 24">
+            <a:extLst>
+              <a:ext uri="{FF2B5EF4-FFF2-40B4-BE49-F238E27FC236}">
+                <a16:creationId xmlns:a16="http://schemas.microsoft.com/office/drawing/2014/main" id="{2A619294-C885-40BF-87A5-E3B23E5EE28F}"/>
+              </a:ext>
+            </a:extLst>
+          </p:cNvPr>
+          <p:cNvSpPr/>
+          <p:nvPr/>
+        </p:nvSpPr>
+        <p:spPr>
+          <a:xfrm>
+            <a:off x="8875018" y="3296168"/>
+            <a:ext cx="706843" cy="325687"/>
+          </a:xfrm>
+          <a:prstGeom prst="rightArrow">
+            <a:avLst>
+              <a:gd name="adj1" fmla="val 39068"/>
+              <a:gd name="adj2" fmla="val 62802"/>
+            </a:avLst>
+          </a:prstGeom>
+          <a:solidFill>
+            <a:srgbClr val="840202"/>
+          </a:solidFill>
+          <a:ln>
+            <a:solidFill>
+              <a:schemeClr val="bg2">
+                <a:lumMod val="50000"/>
+              </a:schemeClr>
+            </a:solidFill>
+          </a:ln>
+        </p:spPr>
+        <p:style>
+          <a:lnRef idx="2">
+            <a:schemeClr val="accent1">
+              <a:shade val="50000"/>
+            </a:schemeClr>
+          </a:lnRef>
+          <a:fillRef idx="1">
+            <a:schemeClr val="accent1"/>
+          </a:fillRef>
+          <a:effectRef idx="0">
+            <a:schemeClr val="accent1"/>
+          </a:effectRef>
+          <a:fontRef idx="minor">
+            <a:schemeClr val="lt1"/>
+          </a:fontRef>
+        </p:style>
+        <p:txBody>
+          <a:bodyPr rtlCol="0" anchor="ctr"/>
+          <a:lstStyle/>
+          <a:p>
+            <a:pPr algn="ctr"/>
+            <a:endParaRPr lang="ko-KR" altLang="en-US"/>
+          </a:p>
+        </p:txBody>
+      </p:sp>
+      <p:sp>
+        <p:nvSpPr>
+          <p:cNvPr id="26" name="TextBox 25">
+            <a:extLst>
+              <a:ext uri="{FF2B5EF4-FFF2-40B4-BE49-F238E27FC236}">
+                <a16:creationId xmlns:a16="http://schemas.microsoft.com/office/drawing/2014/main" id="{36185A1E-B7D7-4235-9ABC-C0DDBCAECCCA}"/>
+              </a:ext>
+            </a:extLst>
+          </p:cNvPr>
+          <p:cNvSpPr txBox="1"/>
+          <p:nvPr/>
+        </p:nvSpPr>
+        <p:spPr>
+          <a:xfrm>
+            <a:off x="8854698" y="2960100"/>
+            <a:ext cx="706843" cy="369332"/>
+          </a:xfrm>
+          <a:prstGeom prst="rect">
+            <a:avLst/>
+          </a:prstGeom>
+          <a:noFill/>
+        </p:spPr>
+        <p:txBody>
+          <a:bodyPr wrap="square" rtlCol="0">
+            <a:spAutoFit/>
+          </a:bodyPr>
+          <a:lstStyle/>
+          <a:p>
+            <a:pPr algn="ctr"/>
+            <a:r>
+              <a:rPr lang="en-US" altLang="ko-KR" dirty="0"/>
+              <a:t>yes</a:t>
+            </a:r>
+            <a:endParaRPr lang="ko-KR" altLang="en-US" dirty="0"/>
+          </a:p>
+        </p:txBody>
+      </p:sp>
+      <p:sp>
+        <p:nvSpPr>
+          <p:cNvPr id="27" name="TextBox 26">
+            <a:extLst>
+              <a:ext uri="{FF2B5EF4-FFF2-40B4-BE49-F238E27FC236}">
+                <a16:creationId xmlns:a16="http://schemas.microsoft.com/office/drawing/2014/main" id="{2F61551E-B74D-4954-AFE0-6744D2337E90}"/>
+              </a:ext>
+            </a:extLst>
+          </p:cNvPr>
+          <p:cNvSpPr txBox="1"/>
+          <p:nvPr/>
+        </p:nvSpPr>
+        <p:spPr>
+          <a:xfrm>
+            <a:off x="8195651" y="4294193"/>
+            <a:ext cx="706843" cy="369332"/>
+          </a:xfrm>
+          <a:prstGeom prst="rect">
+            <a:avLst/>
+          </a:prstGeom>
+          <a:noFill/>
+        </p:spPr>
+        <p:txBody>
+          <a:bodyPr wrap="square" rtlCol="0">
+            <a:spAutoFit/>
+          </a:bodyPr>
+          <a:lstStyle/>
+          <a:p>
+            <a:pPr algn="ctr"/>
+            <a:r>
+              <a:rPr lang="en-US" altLang="ko-KR" dirty="0"/>
+              <a:t>no</a:t>
+            </a:r>
+            <a:endParaRPr lang="ko-KR" altLang="en-US" dirty="0"/>
+          </a:p>
+        </p:txBody>
+      </p:sp>
+      <p:sp>
+        <p:nvSpPr>
+          <p:cNvPr id="28" name="화살표: 오른쪽 27">
+            <a:extLst>
+              <a:ext uri="{FF2B5EF4-FFF2-40B4-BE49-F238E27FC236}">
+                <a16:creationId xmlns:a16="http://schemas.microsoft.com/office/drawing/2014/main" id="{DB9D9521-CAC8-41D6-8EA3-F63EA6A9281B}"/>
+              </a:ext>
+            </a:extLst>
+          </p:cNvPr>
+          <p:cNvSpPr/>
+          <p:nvPr/>
+        </p:nvSpPr>
+        <p:spPr>
+          <a:xfrm rot="18296959">
+            <a:off x="9513399" y="4500682"/>
+            <a:ext cx="706843" cy="325687"/>
+          </a:xfrm>
+          <a:prstGeom prst="rightArrow">
+            <a:avLst>
+              <a:gd name="adj1" fmla="val 39068"/>
+              <a:gd name="adj2" fmla="val 62802"/>
+            </a:avLst>
+          </a:prstGeom>
+          <a:solidFill>
+            <a:srgbClr val="840202"/>
+          </a:solidFill>
+          <a:ln>
+            <a:solidFill>
+              <a:schemeClr val="bg2">
+                <a:lumMod val="50000"/>
+              </a:schemeClr>
+            </a:solidFill>
+          </a:ln>
+        </p:spPr>
+        <p:style>
+          <a:lnRef idx="2">
+            <a:schemeClr val="accent1">
+              <a:shade val="50000"/>
+            </a:schemeClr>
+          </a:lnRef>
+          <a:fillRef idx="1">
+            <a:schemeClr val="accent1"/>
+          </a:fillRef>
+          <a:effectRef idx="0">
+            <a:schemeClr val="accent1"/>
+          </a:effectRef>
+          <a:fontRef idx="minor">
+            <a:schemeClr val="lt1"/>
+          </a:fontRef>
+        </p:style>
+        <p:txBody>
+          <a:bodyPr rtlCol="0" anchor="ctr"/>
+          <a:lstStyle/>
+          <a:p>
+            <a:pPr algn="ctr"/>
+            <a:endParaRPr lang="ko-KR" altLang="en-US"/>
+          </a:p>
+        </p:txBody>
+      </p:sp>
+      <p:sp>
+        <p:nvSpPr>
+          <p:cNvPr id="5" name="타원 4">
+            <a:extLst>
+              <a:ext uri="{FF2B5EF4-FFF2-40B4-BE49-F238E27FC236}">
+                <a16:creationId xmlns:a16="http://schemas.microsoft.com/office/drawing/2014/main" id="{2BC4EB81-161E-4457-9B8E-0FA55735355E}"/>
+              </a:ext>
+            </a:extLst>
+          </p:cNvPr>
+          <p:cNvSpPr/>
+          <p:nvPr/>
+        </p:nvSpPr>
+        <p:spPr>
+          <a:xfrm>
+            <a:off x="7713511" y="4007251"/>
+            <a:ext cx="1278519" cy="1275399"/>
+          </a:xfrm>
+          <a:prstGeom prst="ellipse">
+            <a:avLst/>
+          </a:prstGeom>
+          <a:noFill/>
+          <a:ln w="25400">
+            <a:solidFill>
+              <a:srgbClr val="FF0000"/>
+            </a:solidFill>
+          </a:ln>
+        </p:spPr>
+        <p:style>
+          <a:lnRef idx="2">
+            <a:schemeClr val="accent1">
+              <a:shade val="50000"/>
+            </a:schemeClr>
+          </a:lnRef>
+          <a:fillRef idx="1">
+            <a:schemeClr val="accent1"/>
+          </a:fillRef>
+          <a:effectRef idx="0">
+            <a:schemeClr val="accent1"/>
+          </a:effectRef>
+          <a:fontRef idx="minor">
+            <a:schemeClr val="lt1"/>
+          </a:fontRef>
+        </p:style>
+        <p:txBody>
+          <a:bodyPr rtlCol="0" anchor="ctr"/>
+          <a:lstStyle/>
+          <a:p>
+            <a:pPr algn="ctr"/>
+            <a:endParaRPr lang="ko-KR" altLang="en-US"/>
           </a:p>
         </p:txBody>
       </p:sp>
     </p:spTree>
     <p:extLst>
       <p:ext uri="{BB962C8B-B14F-4D97-AF65-F5344CB8AC3E}">
-        <p14:creationId xmlns:p14="http://schemas.microsoft.com/office/powerpoint/2010/main" val="2928021254"/>
+        <p14:creationId xmlns:p14="http://schemas.microsoft.com/office/powerpoint/2010/main" val="4273060728"/>
       </p:ext>
     </p:extLst>
   </p:cSld>
@@ -5611,7 +7888,7 @@
 </p:sld>
 </file>
 
-<file path=ppt/slides/slide13.xml><?xml version="1.0" encoding="utf-8"?>
+<file path=ppt/slides/slide15.xml><?xml version="1.0" encoding="utf-8"?>
 <p:sld xmlns:a="http://schemas.openxmlformats.org/drawingml/2006/main" xmlns:r="http://schemas.openxmlformats.org/officeDocument/2006/relationships" xmlns:p="http://schemas.openxmlformats.org/presentationml/2006/main">
   <p:cSld>
     <p:spTree>
@@ -5685,7 +7962,7 @@
         </p:nvSpPr>
         <p:spPr>
           <a:xfrm>
-            <a:off x="6463035" y="2032872"/>
+            <a:off x="6463035" y="1923013"/>
             <a:ext cx="5166805" cy="1232466"/>
           </a:xfrm>
           <a:prstGeom prst="rect">
@@ -5863,30 +8140,31 @@
           <a:p>
             <a:r>
               <a:rPr lang="en-US" altLang="ko-KR" dirty="0"/>
-              <a:t>alert </a:t>
+              <a:t>sms_alert.py</a:t>
             </a:r>
             <a:r>
               <a:rPr lang="ko-KR" altLang="en-US" dirty="0"/>
-              <a:t>로그와 </a:t>
-            </a:r>
+              <a:t> 실행</a:t>
+            </a:r>
+            <a:endParaRPr lang="en-US" altLang="ko-KR" dirty="0"/>
+          </a:p>
+          <a:p>
+            <a:pPr marL="0" indent="0">
+              <a:buNone/>
+            </a:pPr>
             <a:r>
               <a:rPr lang="en-US" altLang="ko-KR" dirty="0"/>
-              <a:t>time.txt </a:t>
-            </a:r>
-            <a:r>
-              <a:rPr lang="ko-KR" altLang="en-US" dirty="0"/>
-              <a:t>의 시간을 다르게 설정</a:t>
-            </a:r>
-            <a:endParaRPr lang="en-US" altLang="ko-KR" dirty="0"/>
+              <a:t> - python sms_alert.py</a:t>
+            </a:r>
           </a:p>
         </p:txBody>
       </p:sp>
       <p:pic>
         <p:nvPicPr>
-          <p:cNvPr id="13" name="그림 12">
-            <a:extLst>
-              <a:ext uri="{FF2B5EF4-FFF2-40B4-BE49-F238E27FC236}">
-                <a16:creationId xmlns:a16="http://schemas.microsoft.com/office/drawing/2014/main" id="{D845CD34-0719-45B3-9CB8-847B2B454A8D}"/>
+          <p:cNvPr id="15" name="그림 14">
+            <a:extLst>
+              <a:ext uri="{FF2B5EF4-FFF2-40B4-BE49-F238E27FC236}">
+                <a16:creationId xmlns:a16="http://schemas.microsoft.com/office/drawing/2014/main" id="{938B392C-BA11-4867-8ED3-B2EAFBB5F446}"/>
               </a:ext>
             </a:extLst>
           </p:cNvPr>
@@ -5903,8 +8181,8 @@
         </p:blipFill>
         <p:spPr>
           <a:xfrm>
-            <a:off x="614042" y="1960082"/>
-            <a:ext cx="5114925" cy="2085975"/>
+            <a:off x="594992" y="1838173"/>
+            <a:ext cx="5133975" cy="1390650"/>
           </a:xfrm>
           <a:prstGeom prst="rect">
             <a:avLst/>
@@ -5918,10 +8196,10 @@
       </p:pic>
       <p:pic>
         <p:nvPicPr>
-          <p:cNvPr id="14" name="그림 13">
-            <a:extLst>
-              <a:ext uri="{FF2B5EF4-FFF2-40B4-BE49-F238E27FC236}">
-                <a16:creationId xmlns:a16="http://schemas.microsoft.com/office/drawing/2014/main" id="{7B2BD559-0C76-4E31-A168-532D298A4AA8}"/>
+          <p:cNvPr id="4" name="그림 3">
+            <a:extLst>
+              <a:ext uri="{FF2B5EF4-FFF2-40B4-BE49-F238E27FC236}">
+                <a16:creationId xmlns:a16="http://schemas.microsoft.com/office/drawing/2014/main" id="{BF8A5BF8-53BB-4F8C-9C0E-7863A4D59B2F}"/>
               </a:ext>
             </a:extLst>
           </p:cNvPr>
@@ -5930,16 +8208,21 @@
           </p:cNvPicPr>
           <p:nvPr/>
         </p:nvPicPr>
-        <p:blipFill>
-          <a:blip r:embed="rId3"/>
-          <a:stretch>
-            <a:fillRect/>
-          </a:stretch>
+        <p:blipFill rotWithShape="1">
+          <a:blip r:embed="rId3">
+            <a:extLst>
+              <a:ext uri="{28A0092B-C50C-407E-A947-70E740481C1C}">
+                <a14:useLocalDpi xmlns:a14="http://schemas.microsoft.com/office/drawing/2010/main" val="0"/>
+              </a:ext>
+            </a:extLst>
+          </a:blip>
+          <a:srcRect t="1427" b="66290"/>
+          <a:stretch/>
         </p:blipFill>
         <p:spPr>
           <a:xfrm>
-            <a:off x="604517" y="5328528"/>
-            <a:ext cx="5124450" cy="371475"/>
+            <a:off x="1305247" y="3980733"/>
+            <a:ext cx="3888190" cy="2714013"/>
           </a:xfrm>
           <a:prstGeom prst="rect">
             <a:avLst/>
@@ -5953,426 +8236,10 @@
       </p:pic>
       <p:sp>
         <p:nvSpPr>
-          <p:cNvPr id="16" name="직사각형 15">
-            <a:extLst>
-              <a:ext uri="{FF2B5EF4-FFF2-40B4-BE49-F238E27FC236}">
-                <a16:creationId xmlns:a16="http://schemas.microsoft.com/office/drawing/2014/main" id="{5F6B1B6D-EC6B-46EC-A691-19A2D3EF8539}"/>
-              </a:ext>
-            </a:extLst>
-          </p:cNvPr>
-          <p:cNvSpPr/>
-          <p:nvPr/>
-        </p:nvSpPr>
-        <p:spPr>
-          <a:xfrm>
-            <a:off x="604516" y="2075150"/>
-            <a:ext cx="2433651" cy="250724"/>
-          </a:xfrm>
-          <a:prstGeom prst="rect">
-            <a:avLst/>
-          </a:prstGeom>
-          <a:noFill/>
-          <a:ln w="25400">
-            <a:solidFill>
-              <a:srgbClr val="FF0000"/>
-            </a:solidFill>
-          </a:ln>
-        </p:spPr>
-        <p:style>
-          <a:lnRef idx="2">
-            <a:schemeClr val="accent1">
-              <a:shade val="50000"/>
-            </a:schemeClr>
-          </a:lnRef>
-          <a:fillRef idx="1">
-            <a:schemeClr val="accent1"/>
-          </a:fillRef>
-          <a:effectRef idx="0">
-            <a:schemeClr val="accent1"/>
-          </a:effectRef>
-          <a:fontRef idx="minor">
-            <a:schemeClr val="lt1"/>
-          </a:fontRef>
-        </p:style>
-        <p:txBody>
-          <a:bodyPr rtlCol="0" anchor="ctr"/>
-          <a:lstStyle/>
-          <a:p>
-            <a:pPr algn="ctr"/>
-            <a:endParaRPr lang="ko-KR" altLang="en-US"/>
-          </a:p>
-        </p:txBody>
-      </p:sp>
-      <p:sp>
-        <p:nvSpPr>
-          <p:cNvPr id="17" name="직사각형 16">
-            <a:extLst>
-              <a:ext uri="{FF2B5EF4-FFF2-40B4-BE49-F238E27FC236}">
-                <a16:creationId xmlns:a16="http://schemas.microsoft.com/office/drawing/2014/main" id="{B28534BD-49D0-4E08-AE83-7BF676DBBEC3}"/>
-              </a:ext>
-            </a:extLst>
-          </p:cNvPr>
-          <p:cNvSpPr/>
-          <p:nvPr/>
-        </p:nvSpPr>
-        <p:spPr>
-          <a:xfrm>
-            <a:off x="604517" y="5427408"/>
-            <a:ext cx="2354993" cy="250724"/>
-          </a:xfrm>
-          <a:prstGeom prst="rect">
-            <a:avLst/>
-          </a:prstGeom>
-          <a:noFill/>
-          <a:ln w="25400">
-            <a:solidFill>
-              <a:srgbClr val="FF0000"/>
-            </a:solidFill>
-          </a:ln>
-        </p:spPr>
-        <p:style>
-          <a:lnRef idx="2">
-            <a:schemeClr val="accent1">
-              <a:shade val="50000"/>
-            </a:schemeClr>
-          </a:lnRef>
-          <a:fillRef idx="1">
-            <a:schemeClr val="accent1"/>
-          </a:fillRef>
-          <a:effectRef idx="0">
-            <a:schemeClr val="accent1"/>
-          </a:effectRef>
-          <a:fontRef idx="minor">
-            <a:schemeClr val="lt1"/>
-          </a:fontRef>
-        </p:style>
-        <p:txBody>
-          <a:bodyPr rtlCol="0" anchor="ctr"/>
-          <a:lstStyle/>
-          <a:p>
-            <a:pPr algn="ctr"/>
-            <a:endParaRPr lang="ko-KR" altLang="en-US"/>
-          </a:p>
-        </p:txBody>
-      </p:sp>
-      <p:cxnSp>
-        <p:nvCxnSpPr>
-          <p:cNvPr id="8" name="직선 연결선 7">
-            <a:extLst>
-              <a:ext uri="{FF2B5EF4-FFF2-40B4-BE49-F238E27FC236}">
-                <a16:creationId xmlns:a16="http://schemas.microsoft.com/office/drawing/2014/main" id="{BAEBEDF8-6095-41A7-A717-AF3C29E99583}"/>
-              </a:ext>
-            </a:extLst>
-          </p:cNvPr>
-          <p:cNvCxnSpPr>
-            <a:cxnSpLocks/>
-          </p:cNvCxnSpPr>
-          <p:nvPr/>
-        </p:nvCxnSpPr>
-        <p:spPr>
-          <a:xfrm>
-            <a:off x="838200" y="1091953"/>
-            <a:ext cx="10633800" cy="0"/>
-          </a:xfrm>
-          <a:prstGeom prst="line">
-            <a:avLst/>
-          </a:prstGeom>
-          <a:ln w="25400">
-            <a:solidFill>
-              <a:schemeClr val="bg1">
-                <a:lumMod val="85000"/>
-              </a:schemeClr>
-            </a:solidFill>
-          </a:ln>
-        </p:spPr>
-        <p:style>
-          <a:lnRef idx="1">
-            <a:schemeClr val="accent1"/>
-          </a:lnRef>
-          <a:fillRef idx="0">
-            <a:schemeClr val="accent1"/>
-          </a:fillRef>
-          <a:effectRef idx="0">
-            <a:schemeClr val="accent1"/>
-          </a:effectRef>
-          <a:fontRef idx="minor">
-            <a:schemeClr val="tx1"/>
-          </a:fontRef>
-        </p:style>
-      </p:cxnSp>
-      <p:sp>
-        <p:nvSpPr>
-          <p:cNvPr id="9" name="이등변 삼각형 8">
-            <a:extLst>
-              <a:ext uri="{FF2B5EF4-FFF2-40B4-BE49-F238E27FC236}">
-                <a16:creationId xmlns:a16="http://schemas.microsoft.com/office/drawing/2014/main" id="{683FD27D-EB67-40D2-BD6B-4F95AB11E42D}"/>
-              </a:ext>
-            </a:extLst>
-          </p:cNvPr>
-          <p:cNvSpPr/>
-          <p:nvPr/>
-        </p:nvSpPr>
-        <p:spPr>
-          <a:xfrm>
-            <a:off x="11651226" y="6318000"/>
-            <a:ext cx="540774" cy="540000"/>
-          </a:xfrm>
-          <a:prstGeom prst="triangle">
-            <a:avLst>
-              <a:gd name="adj" fmla="val 100000"/>
-            </a:avLst>
-          </a:prstGeom>
-          <a:solidFill>
-            <a:srgbClr val="840202"/>
-          </a:solidFill>
-          <a:ln>
-            <a:noFill/>
-          </a:ln>
-        </p:spPr>
-        <p:style>
-          <a:lnRef idx="2">
-            <a:schemeClr val="accent1">
-              <a:shade val="50000"/>
-            </a:schemeClr>
-          </a:lnRef>
-          <a:fillRef idx="1">
-            <a:schemeClr val="accent1"/>
-          </a:fillRef>
-          <a:effectRef idx="0">
-            <a:schemeClr val="accent1"/>
-          </a:effectRef>
-          <a:fontRef idx="minor">
-            <a:schemeClr val="lt1"/>
-          </a:fontRef>
-        </p:style>
-        <p:txBody>
-          <a:bodyPr rtlCol="0" anchor="ctr"/>
-          <a:lstStyle/>
-          <a:p>
-            <a:pPr algn="ctr"/>
-            <a:endParaRPr lang="ko-KR" altLang="en-US" dirty="0"/>
-          </a:p>
-        </p:txBody>
-      </p:sp>
-      <p:sp>
-        <p:nvSpPr>
-          <p:cNvPr id="11" name="이등변 삼각형 10">
-            <a:extLst>
-              <a:ext uri="{FF2B5EF4-FFF2-40B4-BE49-F238E27FC236}">
-                <a16:creationId xmlns:a16="http://schemas.microsoft.com/office/drawing/2014/main" id="{EA660BB8-6A3E-4747-B9FE-676292B2FE5D}"/>
-              </a:ext>
-            </a:extLst>
-          </p:cNvPr>
-          <p:cNvSpPr/>
-          <p:nvPr/>
-        </p:nvSpPr>
-        <p:spPr>
-          <a:xfrm rot="10800000">
-            <a:off x="0" y="0"/>
-            <a:ext cx="540774" cy="540000"/>
-          </a:xfrm>
-          <a:prstGeom prst="triangle">
-            <a:avLst>
-              <a:gd name="adj" fmla="val 100000"/>
-            </a:avLst>
-          </a:prstGeom>
-          <a:solidFill>
-            <a:srgbClr val="840202"/>
-          </a:solidFill>
-          <a:ln>
-            <a:noFill/>
-          </a:ln>
-        </p:spPr>
-        <p:style>
-          <a:lnRef idx="2">
-            <a:schemeClr val="accent1">
-              <a:shade val="50000"/>
-            </a:schemeClr>
-          </a:lnRef>
-          <a:fillRef idx="1">
-            <a:schemeClr val="accent1"/>
-          </a:fillRef>
-          <a:effectRef idx="0">
-            <a:schemeClr val="accent1"/>
-          </a:effectRef>
-          <a:fontRef idx="minor">
-            <a:schemeClr val="lt1"/>
-          </a:fontRef>
-        </p:style>
-        <p:txBody>
-          <a:bodyPr rtlCol="0" anchor="ctr"/>
-          <a:lstStyle/>
-          <a:p>
-            <a:pPr algn="ctr"/>
-            <a:endParaRPr lang="ko-KR" altLang="en-US" dirty="0"/>
-          </a:p>
-        </p:txBody>
-      </p:sp>
-      <p:sp>
-        <p:nvSpPr>
-          <p:cNvPr id="12" name="TextBox 11">
-            <a:extLst>
-              <a:ext uri="{FF2B5EF4-FFF2-40B4-BE49-F238E27FC236}">
-                <a16:creationId xmlns:a16="http://schemas.microsoft.com/office/drawing/2014/main" id="{2700A795-DA94-4341-ABCA-482824ADCE39}"/>
-              </a:ext>
-            </a:extLst>
-          </p:cNvPr>
-          <p:cNvSpPr txBox="1"/>
-          <p:nvPr/>
-        </p:nvSpPr>
-        <p:spPr>
-          <a:xfrm>
-            <a:off x="2363571" y="1543983"/>
-            <a:ext cx="1789683" cy="323165"/>
-          </a:xfrm>
-          <a:prstGeom prst="rect">
-            <a:avLst/>
-          </a:prstGeom>
-          <a:noFill/>
-        </p:spPr>
-        <p:txBody>
-          <a:bodyPr wrap="square" rtlCol="0">
-            <a:spAutoFit/>
-          </a:bodyPr>
-          <a:lstStyle/>
-          <a:p>
-            <a:r>
-              <a:rPr lang="en-US" altLang="ko-KR" sz="1500" dirty="0"/>
-              <a:t>&lt;snort</a:t>
-            </a:r>
-            <a:r>
-              <a:rPr lang="ko-KR" altLang="en-US" sz="1500" dirty="0"/>
-              <a:t> </a:t>
-            </a:r>
-            <a:r>
-              <a:rPr lang="en-US" altLang="ko-KR" sz="1500" dirty="0"/>
-              <a:t>log&gt;</a:t>
-            </a:r>
-            <a:endParaRPr lang="ko-KR" altLang="en-US" sz="1500" dirty="0"/>
-          </a:p>
-        </p:txBody>
-      </p:sp>
-      <p:sp>
-        <p:nvSpPr>
-          <p:cNvPr id="15" name="TextBox 14">
-            <a:extLst>
-              <a:ext uri="{FF2B5EF4-FFF2-40B4-BE49-F238E27FC236}">
-                <a16:creationId xmlns:a16="http://schemas.microsoft.com/office/drawing/2014/main" id="{9EA92BD1-2AF4-41A9-8861-AC2BD5E34F1E}"/>
-              </a:ext>
-            </a:extLst>
-          </p:cNvPr>
-          <p:cNvSpPr txBox="1"/>
-          <p:nvPr/>
-        </p:nvSpPr>
-        <p:spPr>
-          <a:xfrm>
-            <a:off x="1989245" y="4869802"/>
-            <a:ext cx="2354993" cy="323165"/>
-          </a:xfrm>
-          <a:prstGeom prst="rect">
-            <a:avLst/>
-          </a:prstGeom>
-          <a:noFill/>
-        </p:spPr>
-        <p:txBody>
-          <a:bodyPr wrap="square" rtlCol="0">
-            <a:spAutoFit/>
-          </a:bodyPr>
-          <a:lstStyle/>
-          <a:p>
-            <a:r>
-              <a:rPr lang="en-US" altLang="ko-KR" sz="1500" dirty="0"/>
-              <a:t>&lt;time.txt </a:t>
-            </a:r>
-            <a:r>
-              <a:rPr lang="ko-KR" altLang="en-US" sz="1500" dirty="0"/>
-              <a:t>파일 내 시간</a:t>
-            </a:r>
-            <a:r>
-              <a:rPr lang="en-US" altLang="ko-KR" sz="1500" dirty="0"/>
-              <a:t>&gt;</a:t>
-            </a:r>
-            <a:endParaRPr lang="ko-KR" altLang="en-US" sz="1500" dirty="0"/>
-          </a:p>
-        </p:txBody>
-      </p:sp>
-    </p:spTree>
-    <p:extLst>
-      <p:ext uri="{BB962C8B-B14F-4D97-AF65-F5344CB8AC3E}">
-        <p14:creationId xmlns:p14="http://schemas.microsoft.com/office/powerpoint/2010/main" val="4273060728"/>
-      </p:ext>
-    </p:extLst>
-  </p:cSld>
-  <p:clrMapOvr>
-    <a:masterClrMapping/>
-  </p:clrMapOvr>
-</p:sld>
-</file>
-
-<file path=ppt/slides/slide14.xml><?xml version="1.0" encoding="utf-8"?>
-<p:sld xmlns:a="http://schemas.openxmlformats.org/drawingml/2006/main" xmlns:r="http://schemas.openxmlformats.org/officeDocument/2006/relationships" xmlns:p="http://schemas.openxmlformats.org/presentationml/2006/main">
-  <p:cSld>
-    <p:spTree>
-      <p:nvGrpSpPr>
-        <p:cNvPr id="1" name=""/>
-        <p:cNvGrpSpPr/>
-        <p:nvPr/>
-      </p:nvGrpSpPr>
-      <p:grpSpPr>
-        <a:xfrm>
-          <a:off x="0" y="0"/>
-          <a:ext cx="0" cy="0"/>
-          <a:chOff x="0" y="0"/>
-          <a:chExt cx="0" cy="0"/>
-        </a:xfrm>
-      </p:grpSpPr>
-      <p:sp>
-        <p:nvSpPr>
-          <p:cNvPr id="2" name="제목 1">
-            <a:extLst>
-              <a:ext uri="{FF2B5EF4-FFF2-40B4-BE49-F238E27FC236}">
-                <a16:creationId xmlns:a16="http://schemas.microsoft.com/office/drawing/2014/main" id="{3687D5C3-FD77-409D-9E6F-3374E84F699D}"/>
-              </a:ext>
-            </a:extLst>
-          </p:cNvPr>
-          <p:cNvSpPr>
-            <a:spLocks noGrp="1"/>
-          </p:cNvSpPr>
-          <p:nvPr>
-            <p:ph type="title"/>
-          </p:nvPr>
-        </p:nvSpPr>
-        <p:spPr>
-          <a:xfrm>
-            <a:off x="720000" y="-36000"/>
-            <a:ext cx="10515600" cy="1325563"/>
-          </a:xfrm>
-        </p:spPr>
-        <p:txBody>
-          <a:bodyPr/>
-          <a:lstStyle/>
-          <a:p>
-            <a:r>
-              <a:rPr lang="ko-KR" altLang="en-US" dirty="0"/>
-              <a:t>세부 내용 </a:t>
-            </a:r>
-            <a:r>
-              <a:rPr lang="en-US" altLang="ko-KR" dirty="0"/>
-              <a:t>– 1</a:t>
-            </a:r>
-            <a:r>
-              <a:rPr lang="ko-KR" altLang="en-US" dirty="0"/>
-              <a:t>차 테스트</a:t>
-            </a:r>
-          </a:p>
-        </p:txBody>
-      </p:sp>
-      <p:sp>
-        <p:nvSpPr>
-          <p:cNvPr id="10" name="내용 개체 틀 2">
-            <a:extLst>
-              <a:ext uri="{FF2B5EF4-FFF2-40B4-BE49-F238E27FC236}">
-                <a16:creationId xmlns:a16="http://schemas.microsoft.com/office/drawing/2014/main" id="{CEF90079-3D4E-4112-BCBB-B7D34BC940AA}"/>
+          <p:cNvPr id="9" name="내용 개체 틀 2">
+            <a:extLst>
+              <a:ext uri="{FF2B5EF4-FFF2-40B4-BE49-F238E27FC236}">
+                <a16:creationId xmlns:a16="http://schemas.microsoft.com/office/drawing/2014/main" id="{671855BC-C21D-4F85-8BAC-A6E64296972C}"/>
               </a:ext>
             </a:extLst>
           </p:cNvPr>
@@ -6383,8 +8250,8 @@
         </p:nvSpPr>
         <p:spPr>
           <a:xfrm>
-            <a:off x="6463035" y="1923013"/>
-            <a:ext cx="5166805" cy="1232466"/>
+            <a:off x="6463034" y="5167311"/>
+            <a:ext cx="5373366" cy="1232466"/>
           </a:xfrm>
           <a:prstGeom prst="rect">
             <a:avLst/>
@@ -6561,286 +8428,11 @@
           <a:p>
             <a:r>
               <a:rPr lang="en-US" altLang="ko-KR" dirty="0"/>
-              <a:t>sms_alert.py</a:t>
+              <a:t>SMS </a:t>
             </a:r>
             <a:r>
               <a:rPr lang="ko-KR" altLang="en-US" dirty="0"/>
-              <a:t> 실행</a:t>
-            </a:r>
-            <a:endParaRPr lang="en-US" altLang="ko-KR" dirty="0"/>
-          </a:p>
-        </p:txBody>
-      </p:sp>
-      <p:pic>
-        <p:nvPicPr>
-          <p:cNvPr id="15" name="그림 14">
-            <a:extLst>
-              <a:ext uri="{FF2B5EF4-FFF2-40B4-BE49-F238E27FC236}">
-                <a16:creationId xmlns:a16="http://schemas.microsoft.com/office/drawing/2014/main" id="{938B392C-BA11-4867-8ED3-B2EAFBB5F446}"/>
-              </a:ext>
-            </a:extLst>
-          </p:cNvPr>
-          <p:cNvPicPr>
-            <a:picLocks noChangeAspect="1"/>
-          </p:cNvPicPr>
-          <p:nvPr/>
-        </p:nvPicPr>
-        <p:blipFill>
-          <a:blip r:embed="rId2"/>
-          <a:stretch>
-            <a:fillRect/>
-          </a:stretch>
-        </p:blipFill>
-        <p:spPr>
-          <a:xfrm>
-            <a:off x="594992" y="1838173"/>
-            <a:ext cx="5133975" cy="1390650"/>
-          </a:xfrm>
-          <a:prstGeom prst="rect">
-            <a:avLst/>
-          </a:prstGeom>
-          <a:ln>
-            <a:solidFill>
-              <a:schemeClr val="tx1"/>
-            </a:solidFill>
-          </a:ln>
-        </p:spPr>
-      </p:pic>
-      <p:pic>
-        <p:nvPicPr>
-          <p:cNvPr id="4" name="그림 3">
-            <a:extLst>
-              <a:ext uri="{FF2B5EF4-FFF2-40B4-BE49-F238E27FC236}">
-                <a16:creationId xmlns:a16="http://schemas.microsoft.com/office/drawing/2014/main" id="{BF8A5BF8-53BB-4F8C-9C0E-7863A4D59B2F}"/>
-              </a:ext>
-            </a:extLst>
-          </p:cNvPr>
-          <p:cNvPicPr>
-            <a:picLocks noChangeAspect="1"/>
-          </p:cNvPicPr>
-          <p:nvPr/>
-        </p:nvPicPr>
-        <p:blipFill rotWithShape="1">
-          <a:blip r:embed="rId3">
-            <a:extLst>
-              <a:ext uri="{28A0092B-C50C-407E-A947-70E740481C1C}">
-                <a14:useLocalDpi xmlns:a14="http://schemas.microsoft.com/office/drawing/2010/main" val="0"/>
-              </a:ext>
-            </a:extLst>
-          </a:blip>
-          <a:srcRect t="1427" b="66290"/>
-          <a:stretch/>
-        </p:blipFill>
-        <p:spPr>
-          <a:xfrm>
-            <a:off x="1305247" y="3980733"/>
-            <a:ext cx="3888190" cy="2714013"/>
-          </a:xfrm>
-          <a:prstGeom prst="rect">
-            <a:avLst/>
-          </a:prstGeom>
-          <a:ln>
-            <a:solidFill>
-              <a:schemeClr val="tx1"/>
-            </a:solidFill>
-          </a:ln>
-        </p:spPr>
-      </p:pic>
-      <p:sp>
-        <p:nvSpPr>
-          <p:cNvPr id="9" name="내용 개체 틀 2">
-            <a:extLst>
-              <a:ext uri="{FF2B5EF4-FFF2-40B4-BE49-F238E27FC236}">
-                <a16:creationId xmlns:a16="http://schemas.microsoft.com/office/drawing/2014/main" id="{671855BC-C21D-4F85-8BAC-A6E64296972C}"/>
-              </a:ext>
-            </a:extLst>
-          </p:cNvPr>
-          <p:cNvSpPr txBox="1">
-            <a:spLocks/>
-          </p:cNvSpPr>
-          <p:nvPr/>
-        </p:nvSpPr>
-        <p:spPr>
-          <a:xfrm>
-            <a:off x="6463034" y="5167311"/>
-            <a:ext cx="5166805" cy="1232466"/>
-          </a:xfrm>
-          <a:prstGeom prst="rect">
-            <a:avLst/>
-          </a:prstGeom>
-        </p:spPr>
-        <p:txBody>
-          <a:bodyPr vert="horz" lIns="91440" tIns="45720" rIns="91440" bIns="45720" rtlCol="0">
-            <a:normAutofit/>
-          </a:bodyPr>
-          <a:lstStyle>
-            <a:lvl1pPr marL="228600" indent="-228600" algn="l" defTabSz="914400" rtl="0" eaLnBrk="1" latinLnBrk="1" hangingPunct="1">
-              <a:lnSpc>
-                <a:spcPct val="90000"/>
-              </a:lnSpc>
-              <a:spcBef>
-                <a:spcPts val="1000"/>
-              </a:spcBef>
-              <a:buFont typeface="Arial" panose="020B0604020202020204" pitchFamily="34" charset="0"/>
-              <a:buChar char="•"/>
-              <a:defRPr sz="2800" kern="1200">
-                <a:solidFill>
-                  <a:schemeClr val="tx1"/>
-                </a:solidFill>
-                <a:latin typeface="+mn-lt"/>
-                <a:ea typeface="+mn-ea"/>
-                <a:cs typeface="+mn-cs"/>
-              </a:defRPr>
-            </a:lvl1pPr>
-            <a:lvl2pPr marL="685800" indent="-228600" algn="l" defTabSz="914400" rtl="0" eaLnBrk="1" latinLnBrk="1" hangingPunct="1">
-              <a:lnSpc>
-                <a:spcPct val="90000"/>
-              </a:lnSpc>
-              <a:spcBef>
-                <a:spcPts val="500"/>
-              </a:spcBef>
-              <a:buFont typeface="Arial" panose="020B0604020202020204" pitchFamily="34" charset="0"/>
-              <a:buChar char="•"/>
-              <a:defRPr sz="2400" kern="1200">
-                <a:solidFill>
-                  <a:schemeClr val="tx1"/>
-                </a:solidFill>
-                <a:latin typeface="+mn-lt"/>
-                <a:ea typeface="+mn-ea"/>
-                <a:cs typeface="+mn-cs"/>
-              </a:defRPr>
-            </a:lvl2pPr>
-            <a:lvl3pPr marL="1143000" indent="-228600" algn="l" defTabSz="914400" rtl="0" eaLnBrk="1" latinLnBrk="1" hangingPunct="1">
-              <a:lnSpc>
-                <a:spcPct val="90000"/>
-              </a:lnSpc>
-              <a:spcBef>
-                <a:spcPts val="500"/>
-              </a:spcBef>
-              <a:buFont typeface="Arial" panose="020B0604020202020204" pitchFamily="34" charset="0"/>
-              <a:buChar char="•"/>
-              <a:defRPr sz="2000" kern="1200">
-                <a:solidFill>
-                  <a:schemeClr val="tx1"/>
-                </a:solidFill>
-                <a:latin typeface="+mn-lt"/>
-                <a:ea typeface="+mn-ea"/>
-                <a:cs typeface="+mn-cs"/>
-              </a:defRPr>
-            </a:lvl3pPr>
-            <a:lvl4pPr marL="1600200" indent="-228600" algn="l" defTabSz="914400" rtl="0" eaLnBrk="1" latinLnBrk="1" hangingPunct="1">
-              <a:lnSpc>
-                <a:spcPct val="90000"/>
-              </a:lnSpc>
-              <a:spcBef>
-                <a:spcPts val="500"/>
-              </a:spcBef>
-              <a:buFont typeface="Arial" panose="020B0604020202020204" pitchFamily="34" charset="0"/>
-              <a:buChar char="•"/>
-              <a:defRPr sz="1800" kern="1200">
-                <a:solidFill>
-                  <a:schemeClr val="tx1"/>
-                </a:solidFill>
-                <a:latin typeface="+mn-lt"/>
-                <a:ea typeface="+mn-ea"/>
-                <a:cs typeface="+mn-cs"/>
-              </a:defRPr>
-            </a:lvl4pPr>
-            <a:lvl5pPr marL="2057400" indent="-228600" algn="l" defTabSz="914400" rtl="0" eaLnBrk="1" latinLnBrk="1" hangingPunct="1">
-              <a:lnSpc>
-                <a:spcPct val="90000"/>
-              </a:lnSpc>
-              <a:spcBef>
-                <a:spcPts val="500"/>
-              </a:spcBef>
-              <a:buFont typeface="Arial" panose="020B0604020202020204" pitchFamily="34" charset="0"/>
-              <a:buChar char="•"/>
-              <a:defRPr sz="1800" kern="1200">
-                <a:solidFill>
-                  <a:schemeClr val="tx1"/>
-                </a:solidFill>
-                <a:latin typeface="+mn-lt"/>
-                <a:ea typeface="+mn-ea"/>
-                <a:cs typeface="+mn-cs"/>
-              </a:defRPr>
-            </a:lvl5pPr>
-            <a:lvl6pPr marL="2514600" indent="-228600" algn="l" defTabSz="914400" rtl="0" eaLnBrk="1" latinLnBrk="1" hangingPunct="1">
-              <a:lnSpc>
-                <a:spcPct val="90000"/>
-              </a:lnSpc>
-              <a:spcBef>
-                <a:spcPts val="500"/>
-              </a:spcBef>
-              <a:buFont typeface="Arial" panose="020B0604020202020204" pitchFamily="34" charset="0"/>
-              <a:buChar char="•"/>
-              <a:defRPr sz="1800" kern="1200">
-                <a:solidFill>
-                  <a:schemeClr val="tx1"/>
-                </a:solidFill>
-                <a:latin typeface="+mn-lt"/>
-                <a:ea typeface="+mn-ea"/>
-                <a:cs typeface="+mn-cs"/>
-              </a:defRPr>
-            </a:lvl6pPr>
-            <a:lvl7pPr marL="2971800" indent="-228600" algn="l" defTabSz="914400" rtl="0" eaLnBrk="1" latinLnBrk="1" hangingPunct="1">
-              <a:lnSpc>
-                <a:spcPct val="90000"/>
-              </a:lnSpc>
-              <a:spcBef>
-                <a:spcPts val="500"/>
-              </a:spcBef>
-              <a:buFont typeface="Arial" panose="020B0604020202020204" pitchFamily="34" charset="0"/>
-              <a:buChar char="•"/>
-              <a:defRPr sz="1800" kern="1200">
-                <a:solidFill>
-                  <a:schemeClr val="tx1"/>
-                </a:solidFill>
-                <a:latin typeface="+mn-lt"/>
-                <a:ea typeface="+mn-ea"/>
-                <a:cs typeface="+mn-cs"/>
-              </a:defRPr>
-            </a:lvl7pPr>
-            <a:lvl8pPr marL="3429000" indent="-228600" algn="l" defTabSz="914400" rtl="0" eaLnBrk="1" latinLnBrk="1" hangingPunct="1">
-              <a:lnSpc>
-                <a:spcPct val="90000"/>
-              </a:lnSpc>
-              <a:spcBef>
-                <a:spcPts val="500"/>
-              </a:spcBef>
-              <a:buFont typeface="Arial" panose="020B0604020202020204" pitchFamily="34" charset="0"/>
-              <a:buChar char="•"/>
-              <a:defRPr sz="1800" kern="1200">
-                <a:solidFill>
-                  <a:schemeClr val="tx1"/>
-                </a:solidFill>
-                <a:latin typeface="+mn-lt"/>
-                <a:ea typeface="+mn-ea"/>
-                <a:cs typeface="+mn-cs"/>
-              </a:defRPr>
-            </a:lvl8pPr>
-            <a:lvl9pPr marL="3886200" indent="-228600" algn="l" defTabSz="914400" rtl="0" eaLnBrk="1" latinLnBrk="1" hangingPunct="1">
-              <a:lnSpc>
-                <a:spcPct val="90000"/>
-              </a:lnSpc>
-              <a:spcBef>
-                <a:spcPts val="500"/>
-              </a:spcBef>
-              <a:buFont typeface="Arial" panose="020B0604020202020204" pitchFamily="34" charset="0"/>
-              <a:buChar char="•"/>
-              <a:defRPr sz="1800" kern="1200">
-                <a:solidFill>
-                  <a:schemeClr val="tx1"/>
-                </a:solidFill>
-                <a:latin typeface="+mn-lt"/>
-                <a:ea typeface="+mn-ea"/>
-                <a:cs typeface="+mn-cs"/>
-              </a:defRPr>
-            </a:lvl9pPr>
-          </a:lstStyle>
-          <a:p>
-            <a:r>
-              <a:rPr lang="ko-KR" altLang="en-US" dirty="0"/>
-              <a:t>테스트 내용 확인</a:t>
+              <a:t>테스트 메시지 내용 확인</a:t>
             </a:r>
             <a:endParaRPr lang="en-US" altLang="ko-KR" dirty="0"/>
           </a:p>
@@ -7109,8 +8701,8 @@
         </p:nvSpPr>
         <p:spPr>
           <a:xfrm>
-            <a:off x="2363571" y="1543983"/>
-            <a:ext cx="1789683" cy="323165"/>
+            <a:off x="2339372" y="1444705"/>
+            <a:ext cx="2203623" cy="323165"/>
           </a:xfrm>
           <a:prstGeom prst="rect">
             <a:avLst/>
@@ -7125,7 +8717,23 @@
           <a:p>
             <a:r>
               <a:rPr lang="en-US" altLang="ko-KR" sz="1500" dirty="0"/>
-              <a:t>&lt;sms_alert.py 1&gt;</a:t>
+              <a:t>&lt;</a:t>
+            </a:r>
+            <a:r>
+              <a:rPr lang="ko-KR" altLang="en-US" sz="1500" dirty="0"/>
+              <a:t>우분투 </a:t>
+            </a:r>
+            <a:r>
+              <a:rPr lang="en-US" altLang="ko-KR" sz="1500" dirty="0"/>
+              <a:t>shell </a:t>
+            </a:r>
+            <a:r>
+              <a:rPr lang="ko-KR" altLang="en-US" sz="1500" dirty="0"/>
+              <a:t>창</a:t>
+            </a:r>
+            <a:r>
+              <a:rPr lang="en-US" altLang="ko-KR" sz="1500" dirty="0"/>
+              <a:t>&gt;</a:t>
             </a:r>
             <a:endParaRPr lang="ko-KR" altLang="en-US" sz="1500" dirty="0"/>
           </a:p>
@@ -7144,7 +8752,7 @@
 </p:sld>
 </file>
 
-<file path=ppt/slides/slide15.xml><?xml version="1.0" encoding="utf-8"?>
+<file path=ppt/slides/slide16.xml><?xml version="1.0" encoding="utf-8"?>
 <p:sld xmlns:a="http://schemas.openxmlformats.org/drawingml/2006/main" xmlns:r="http://schemas.openxmlformats.org/officeDocument/2006/relationships" xmlns:p="http://schemas.openxmlformats.org/presentationml/2006/main">
   <p:cSld>
     <p:spTree>
@@ -7434,8 +9042,8 @@
         </p:nvSpPr>
         <p:spPr>
           <a:xfrm>
-            <a:off x="6463035" y="4686005"/>
-            <a:ext cx="5166805" cy="1232466"/>
+            <a:off x="6463035" y="4940005"/>
+            <a:ext cx="5434325" cy="1232466"/>
           </a:xfrm>
           <a:prstGeom prst="rect">
             <a:avLst/>
@@ -7985,7 +9593,7 @@
 </p:sld>
 </file>
 
-<file path=ppt/slides/slide16.xml><?xml version="1.0" encoding="utf-8"?>
+<file path=ppt/slides/slide17.xml><?xml version="1.0" encoding="utf-8"?>
 <p:sld xmlns:a="http://schemas.openxmlformats.org/drawingml/2006/main" xmlns:r="http://schemas.openxmlformats.org/officeDocument/2006/relationships" xmlns:p="http://schemas.openxmlformats.org/presentationml/2006/main">
   <p:cSld>
     <p:spTree>
@@ -8038,7 +9646,7 @@
             </a:r>
             <a:r>
               <a:rPr lang="ko-KR" altLang="en-US" dirty="0"/>
-              <a:t>최종 확인</a:t>
+              <a:t>최종 테스트</a:t>
             </a:r>
           </a:p>
         </p:txBody>
@@ -8402,8 +10010,8 @@
         </p:nvSpPr>
         <p:spPr>
           <a:xfrm rot="16200000">
-            <a:off x="6428428" y="3765672"/>
-            <a:ext cx="532660" cy="514905"/>
+            <a:off x="5675131" y="3883435"/>
+            <a:ext cx="1712026" cy="514905"/>
           </a:xfrm>
           <a:prstGeom prst="downArrow">
             <a:avLst/>
@@ -8942,7 +10550,7 @@
 </p:sld>
 </file>
 
-<file path=ppt/slides/slide17.xml><?xml version="1.0" encoding="utf-8"?>
+<file path=ppt/slides/slide18.xml><?xml version="1.0" encoding="utf-8"?>
 <p:sld xmlns:a="http://schemas.openxmlformats.org/drawingml/2006/main" xmlns:r="http://schemas.openxmlformats.org/officeDocument/2006/relationships" xmlns:p="http://schemas.openxmlformats.org/presentationml/2006/main">
   <p:cSld>
     <p:spTree>
@@ -9291,7 +10899,7 @@
 </p:sld>
 </file>
 
-<file path=ppt/slides/slide18.xml><?xml version="1.0" encoding="utf-8"?>
+<file path=ppt/slides/slide19.xml><?xml version="1.0" encoding="utf-8"?>
 <p:sld xmlns:a="http://schemas.openxmlformats.org/drawingml/2006/main" xmlns:r="http://schemas.openxmlformats.org/officeDocument/2006/relationships" xmlns:p="http://schemas.openxmlformats.org/presentationml/2006/main">
   <p:cSld>
     <p:spTree>

</xml_diff>

<commit_message>
Hide Token on PPT
</commit_message>
<xml_diff>
--- a/semi_projects/보안탐지 및 SMS 알람/연람희_보안탐지 및 SMS 알람.pptx
+++ b/semi_projects/보안탐지 및 SMS 알람/연람희_보안탐지 및 SMS 알람.pptx
@@ -290,7 +290,7 @@
           <a:p>
             <a:fld id="{D512FCAD-8E72-4490-9D67-FF3ADE8F49C3}" type="datetimeFigureOut">
               <a:rPr lang="ko-KR" altLang="en-US" smtClean="0"/>
-              <a:t>2021-07-19</a:t>
+              <a:t>2021-07-20</a:t>
             </a:fld>
             <a:endParaRPr lang="ko-KR" altLang="en-US"/>
           </a:p>
@@ -488,7 +488,7 @@
           <a:p>
             <a:fld id="{D512FCAD-8E72-4490-9D67-FF3ADE8F49C3}" type="datetimeFigureOut">
               <a:rPr lang="ko-KR" altLang="en-US" smtClean="0"/>
-              <a:t>2021-07-19</a:t>
+              <a:t>2021-07-20</a:t>
             </a:fld>
             <a:endParaRPr lang="ko-KR" altLang="en-US"/>
           </a:p>
@@ -696,7 +696,7 @@
           <a:p>
             <a:fld id="{D512FCAD-8E72-4490-9D67-FF3ADE8F49C3}" type="datetimeFigureOut">
               <a:rPr lang="ko-KR" altLang="en-US" smtClean="0"/>
-              <a:t>2021-07-19</a:t>
+              <a:t>2021-07-20</a:t>
             </a:fld>
             <a:endParaRPr lang="ko-KR" altLang="en-US"/>
           </a:p>
@@ -894,7 +894,7 @@
           <a:p>
             <a:fld id="{D512FCAD-8E72-4490-9D67-FF3ADE8F49C3}" type="datetimeFigureOut">
               <a:rPr lang="ko-KR" altLang="en-US" smtClean="0"/>
-              <a:t>2021-07-19</a:t>
+              <a:t>2021-07-20</a:t>
             </a:fld>
             <a:endParaRPr lang="ko-KR" altLang="en-US"/>
           </a:p>
@@ -1169,7 +1169,7 @@
           <a:p>
             <a:fld id="{D512FCAD-8E72-4490-9D67-FF3ADE8F49C3}" type="datetimeFigureOut">
               <a:rPr lang="ko-KR" altLang="en-US" smtClean="0"/>
-              <a:t>2021-07-19</a:t>
+              <a:t>2021-07-20</a:t>
             </a:fld>
             <a:endParaRPr lang="ko-KR" altLang="en-US"/>
           </a:p>
@@ -1434,7 +1434,7 @@
           <a:p>
             <a:fld id="{D512FCAD-8E72-4490-9D67-FF3ADE8F49C3}" type="datetimeFigureOut">
               <a:rPr lang="ko-KR" altLang="en-US" smtClean="0"/>
-              <a:t>2021-07-19</a:t>
+              <a:t>2021-07-20</a:t>
             </a:fld>
             <a:endParaRPr lang="ko-KR" altLang="en-US"/>
           </a:p>
@@ -1846,7 +1846,7 @@
           <a:p>
             <a:fld id="{D512FCAD-8E72-4490-9D67-FF3ADE8F49C3}" type="datetimeFigureOut">
               <a:rPr lang="ko-KR" altLang="en-US" smtClean="0"/>
-              <a:t>2021-07-19</a:t>
+              <a:t>2021-07-20</a:t>
             </a:fld>
             <a:endParaRPr lang="ko-KR" altLang="en-US"/>
           </a:p>
@@ -1987,7 +1987,7 @@
           <a:p>
             <a:fld id="{D512FCAD-8E72-4490-9D67-FF3ADE8F49C3}" type="datetimeFigureOut">
               <a:rPr lang="ko-KR" altLang="en-US" smtClean="0"/>
-              <a:t>2021-07-19</a:t>
+              <a:t>2021-07-20</a:t>
             </a:fld>
             <a:endParaRPr lang="ko-KR" altLang="en-US"/>
           </a:p>
@@ -2100,7 +2100,7 @@
           <a:p>
             <a:fld id="{D512FCAD-8E72-4490-9D67-FF3ADE8F49C3}" type="datetimeFigureOut">
               <a:rPr lang="ko-KR" altLang="en-US" smtClean="0"/>
-              <a:t>2021-07-19</a:t>
+              <a:t>2021-07-20</a:t>
             </a:fld>
             <a:endParaRPr lang="ko-KR" altLang="en-US"/>
           </a:p>
@@ -2411,7 +2411,7 @@
           <a:p>
             <a:fld id="{D512FCAD-8E72-4490-9D67-FF3ADE8F49C3}" type="datetimeFigureOut">
               <a:rPr lang="ko-KR" altLang="en-US" smtClean="0"/>
-              <a:t>2021-07-19</a:t>
+              <a:t>2021-07-20</a:t>
             </a:fld>
             <a:endParaRPr lang="ko-KR" altLang="en-US"/>
           </a:p>
@@ -2699,7 +2699,7 @@
           <a:p>
             <a:fld id="{D512FCAD-8E72-4490-9D67-FF3ADE8F49C3}" type="datetimeFigureOut">
               <a:rPr lang="ko-KR" altLang="en-US" smtClean="0"/>
-              <a:t>2021-07-19</a:t>
+              <a:t>2021-07-20</a:t>
             </a:fld>
             <a:endParaRPr lang="ko-KR" altLang="en-US"/>
           </a:p>
@@ -2940,7 +2940,7 @@
           <a:p>
             <a:fld id="{D512FCAD-8E72-4490-9D67-FF3ADE8F49C3}" type="datetimeFigureOut">
               <a:rPr lang="ko-KR" altLang="en-US" smtClean="0"/>
-              <a:t>2021-07-19</a:t>
+              <a:t>2021-07-20</a:t>
             </a:fld>
             <a:endParaRPr lang="ko-KR" altLang="en-US"/>
           </a:p>
@@ -3463,7 +3463,7 @@
           <a:p>
             <a:r>
               <a:rPr lang="en-US" altLang="ko-KR" dirty="0"/>
-              <a:t>2021. 07. 15</a:t>
+              <a:t>2021. 07. 20</a:t>
             </a:r>
           </a:p>
           <a:p>
@@ -4567,12 +4567,8 @@
               <a:t>사이트 접속 후 </a:t>
             </a:r>
             <a:r>
-              <a:rPr lang="en-US" altLang="ko-KR" dirty="0" err="1"/>
-              <a:t>sid</a:t>
-            </a:r>
-            <a:r>
               <a:rPr lang="en-US" altLang="ko-KR" dirty="0"/>
-              <a:t>/Token/Test </a:t>
+              <a:t>SID/Token/Test </a:t>
             </a:r>
             <a:r>
               <a:rPr lang="ko-KR" altLang="en-US" dirty="0"/>
@@ -5735,6 +5731,60 @@
           <a:xfrm>
             <a:off x="7236542" y="2121585"/>
             <a:ext cx="511849" cy="108154"/>
+          </a:xfrm>
+          <a:prstGeom prst="rect">
+            <a:avLst/>
+          </a:prstGeom>
+          <a:solidFill>
+            <a:schemeClr val="bg1"/>
+          </a:solidFill>
+          <a:ln>
+            <a:solidFill>
+              <a:schemeClr val="bg1"/>
+            </a:solidFill>
+          </a:ln>
+        </p:spPr>
+        <p:style>
+          <a:lnRef idx="2">
+            <a:schemeClr val="accent1">
+              <a:shade val="50000"/>
+            </a:schemeClr>
+          </a:lnRef>
+          <a:fillRef idx="1">
+            <a:schemeClr val="accent1"/>
+          </a:fillRef>
+          <a:effectRef idx="0">
+            <a:schemeClr val="accent1"/>
+          </a:effectRef>
+          <a:fontRef idx="minor">
+            <a:schemeClr val="lt1"/>
+          </a:fontRef>
+        </p:style>
+        <p:txBody>
+          <a:bodyPr rtlCol="0" anchor="ctr"/>
+          <a:lstStyle/>
+          <a:p>
+            <a:pPr algn="ctr"/>
+            <a:endParaRPr lang="ko-KR" altLang="en-US"/>
+          </a:p>
+        </p:txBody>
+      </p:sp>
+      <p:sp>
+        <p:nvSpPr>
+          <p:cNvPr id="11" name="직사각형 10">
+            <a:extLst>
+              <a:ext uri="{FF2B5EF4-FFF2-40B4-BE49-F238E27FC236}">
+                <a16:creationId xmlns:a16="http://schemas.microsoft.com/office/drawing/2014/main" id="{BCB0800A-1EDD-4318-9825-8F283BFD1EA6}"/>
+              </a:ext>
+            </a:extLst>
+          </p:cNvPr>
+          <p:cNvSpPr/>
+          <p:nvPr/>
+        </p:nvSpPr>
+        <p:spPr>
+          <a:xfrm>
+            <a:off x="8387306" y="1289563"/>
+            <a:ext cx="1493541" cy="126954"/>
           </a:xfrm>
           <a:prstGeom prst="rect">
             <a:avLst/>

</xml_diff>